<commit_message>
fixed some formatting issues
</commit_message>
<xml_diff>
--- a/lectures/2023_GNET749_Lecture1.pptx
+++ b/lectures/2023_GNET749_Lecture1.pptx
@@ -337,6 +337,11 @@
       </a:defRPr>
     </a:lvl9pPr>
   </p:defaultTextStyle>
+  <p:extLst>
+    <p:ext uri="{EFAFB233-063F-42B5-8137-9DF3F51BA10A}">
+      <p15:sldGuideLst xmlns:p15="http://schemas.microsoft.com/office/powerpoint/2012/main"/>
+    </p:ext>
+  </p:extLst>
 </p:presentation>
 </file>
 
@@ -3081,7 +3086,7 @@
           </a:ln>
           <a:extLst>
             <a:ext uri="{C572A759-6A51-4108-AA02-DFA0A04FC94B}">
-              <ma14:wrappingTextBoxFlag xmlns:ma14="http://schemas.microsoft.com/office/mac/drawingml/2011/main" xmlns:a14="http://schemas.microsoft.com/office/drawing/2010/main" xmlns:m="http://schemas.openxmlformats.org/officeDocument/2006/math" xmlns="" val="1"/>
+              <ma14:wrappingTextBoxFlag xmlns="" xmlns:m="http://schemas.openxmlformats.org/officeDocument/2006/math" xmlns:a14="http://schemas.microsoft.com/office/drawing/2010/main" xmlns:ma14="http://schemas.microsoft.com/office/mac/drawingml/2011/main" val="1"/>
             </a:ext>
           </a:extLst>
         </p:spPr>
@@ -3120,7 +3125,7 @@
           </a:ln>
           <a:extLst>
             <a:ext uri="{C572A759-6A51-4108-AA02-DFA0A04FC94B}">
-              <ma14:wrappingTextBoxFlag xmlns:ma14="http://schemas.microsoft.com/office/mac/drawingml/2011/main" xmlns:a14="http://schemas.microsoft.com/office/drawing/2010/main" xmlns:m="http://schemas.openxmlformats.org/officeDocument/2006/math" xmlns="" val="1"/>
+              <ma14:wrappingTextBoxFlag xmlns="" xmlns:m="http://schemas.openxmlformats.org/officeDocument/2006/math" xmlns:a14="http://schemas.microsoft.com/office/drawing/2010/main" xmlns:ma14="http://schemas.microsoft.com/office/mac/drawingml/2011/main" val="1"/>
             </a:ext>
           </a:extLst>
         </p:spPr>
@@ -3965,7 +3970,7 @@
           </a:ln>
           <a:extLst>
             <a:ext uri="{C572A759-6A51-4108-AA02-DFA0A04FC94B}">
-              <ma14:wrappingTextBoxFlag xmlns:ma14="http://schemas.microsoft.com/office/mac/drawingml/2011/main" xmlns:a14="http://schemas.microsoft.com/office/drawing/2010/main" xmlns:m="http://schemas.openxmlformats.org/officeDocument/2006/math" xmlns="" val="1"/>
+              <ma14:wrappingTextBoxFlag xmlns="" xmlns:m="http://schemas.openxmlformats.org/officeDocument/2006/math" xmlns:a14="http://schemas.microsoft.com/office/drawing/2010/main" xmlns:ma14="http://schemas.microsoft.com/office/mac/drawingml/2011/main" val="1"/>
             </a:ext>
           </a:extLst>
         </p:spPr>
@@ -4030,7 +4035,7 @@
           </a:ln>
           <a:extLst>
             <a:ext uri="{C572A759-6A51-4108-AA02-DFA0A04FC94B}">
-              <ma14:wrappingTextBoxFlag xmlns:ma14="http://schemas.microsoft.com/office/mac/drawingml/2011/main" xmlns:a14="http://schemas.microsoft.com/office/drawing/2010/main" xmlns:m="http://schemas.openxmlformats.org/officeDocument/2006/math" xmlns="" val="1"/>
+              <ma14:wrappingTextBoxFlag xmlns="" xmlns:m="http://schemas.openxmlformats.org/officeDocument/2006/math" xmlns:a14="http://schemas.microsoft.com/office/drawing/2010/main" xmlns:ma14="http://schemas.microsoft.com/office/mac/drawingml/2011/main" val="1"/>
             </a:ext>
           </a:extLst>
         </p:spPr>
@@ -4069,7 +4074,7 @@
           </a:ln>
           <a:extLst>
             <a:ext uri="{C572A759-6A51-4108-AA02-DFA0A04FC94B}">
-              <ma14:wrappingTextBoxFlag xmlns:ma14="http://schemas.microsoft.com/office/mac/drawingml/2011/main" xmlns:a14="http://schemas.microsoft.com/office/drawing/2010/main" xmlns:m="http://schemas.openxmlformats.org/officeDocument/2006/math" xmlns="" val="1"/>
+              <ma14:wrappingTextBoxFlag xmlns="" xmlns:m="http://schemas.openxmlformats.org/officeDocument/2006/math" xmlns:a14="http://schemas.microsoft.com/office/drawing/2010/main" xmlns:ma14="http://schemas.microsoft.com/office/mac/drawingml/2011/main" val="1"/>
             </a:ext>
           </a:extLst>
         </p:spPr>
@@ -4104,7 +4109,7 @@
           </a:ln>
           <a:extLst>
             <a:ext uri="{C572A759-6A51-4108-AA02-DFA0A04FC94B}">
-              <ma14:wrappingTextBoxFlag xmlns:ma14="http://schemas.microsoft.com/office/mac/drawingml/2011/main" xmlns:a14="http://schemas.microsoft.com/office/drawing/2010/main" xmlns:m="http://schemas.openxmlformats.org/officeDocument/2006/math" xmlns="" val="1"/>
+              <ma14:wrappingTextBoxFlag xmlns="" xmlns:m="http://schemas.openxmlformats.org/officeDocument/2006/math" xmlns:a14="http://schemas.microsoft.com/office/drawing/2010/main" xmlns:ma14="http://schemas.microsoft.com/office/mac/drawingml/2011/main" val="1"/>
             </a:ext>
           </a:extLst>
         </p:spPr>
@@ -4143,7 +4148,7 @@
           </a:ln>
           <a:extLst>
             <a:ext uri="{C572A759-6A51-4108-AA02-DFA0A04FC94B}">
-              <ma14:wrappingTextBoxFlag xmlns:ma14="http://schemas.microsoft.com/office/mac/drawingml/2011/main" xmlns:a14="http://schemas.microsoft.com/office/drawing/2010/main" xmlns:m="http://schemas.openxmlformats.org/officeDocument/2006/math" xmlns="" val="1"/>
+              <ma14:wrappingTextBoxFlag xmlns="" xmlns:m="http://schemas.openxmlformats.org/officeDocument/2006/math" xmlns:a14="http://schemas.microsoft.com/office/drawing/2010/main" xmlns:ma14="http://schemas.microsoft.com/office/mac/drawingml/2011/main" val="1"/>
             </a:ext>
           </a:extLst>
         </p:spPr>
@@ -4208,7 +4213,7 @@
           </a:ln>
           <a:extLst>
             <a:ext uri="{C572A759-6A51-4108-AA02-DFA0A04FC94B}">
-              <ma14:wrappingTextBoxFlag xmlns:ma14="http://schemas.microsoft.com/office/mac/drawingml/2011/main" xmlns:a14="http://schemas.microsoft.com/office/drawing/2010/main" xmlns:m="http://schemas.openxmlformats.org/officeDocument/2006/math" xmlns="" val="1"/>
+              <ma14:wrappingTextBoxFlag xmlns="" xmlns:m="http://schemas.openxmlformats.org/officeDocument/2006/math" xmlns:a14="http://schemas.microsoft.com/office/drawing/2010/main" xmlns:ma14="http://schemas.microsoft.com/office/mac/drawingml/2011/main" val="1"/>
             </a:ext>
           </a:extLst>
         </p:spPr>
@@ -4273,7 +4278,7 @@
           </a:ln>
           <a:extLst>
             <a:ext uri="{C572A759-6A51-4108-AA02-DFA0A04FC94B}">
-              <ma14:wrappingTextBoxFlag xmlns:ma14="http://schemas.microsoft.com/office/mac/drawingml/2011/main" xmlns:a14="http://schemas.microsoft.com/office/drawing/2010/main" xmlns:m="http://schemas.openxmlformats.org/officeDocument/2006/math" xmlns="" val="1"/>
+              <ma14:wrappingTextBoxFlag xmlns="" xmlns:m="http://schemas.openxmlformats.org/officeDocument/2006/math" xmlns:a14="http://schemas.microsoft.com/office/drawing/2010/main" xmlns:ma14="http://schemas.microsoft.com/office/mac/drawingml/2011/main" val="1"/>
             </a:ext>
           </a:extLst>
         </p:spPr>
@@ -4312,7 +4317,7 @@
           </a:ln>
           <a:extLst>
             <a:ext uri="{C572A759-6A51-4108-AA02-DFA0A04FC94B}">
-              <ma14:wrappingTextBoxFlag xmlns:ma14="http://schemas.microsoft.com/office/mac/drawingml/2011/main" xmlns:a14="http://schemas.microsoft.com/office/drawing/2010/main" xmlns:m="http://schemas.openxmlformats.org/officeDocument/2006/math" xmlns="" val="1"/>
+              <ma14:wrappingTextBoxFlag xmlns="" xmlns:m="http://schemas.openxmlformats.org/officeDocument/2006/math" xmlns:a14="http://schemas.microsoft.com/office/drawing/2010/main" xmlns:ma14="http://schemas.microsoft.com/office/mac/drawingml/2011/main" val="1"/>
             </a:ext>
           </a:extLst>
         </p:spPr>
@@ -4378,7 +4383,7 @@
           </a:ln>
           <a:extLst>
             <a:ext uri="{C572A759-6A51-4108-AA02-DFA0A04FC94B}">
-              <ma14:wrappingTextBoxFlag xmlns:ma14="http://schemas.microsoft.com/office/mac/drawingml/2011/main" xmlns:a14="http://schemas.microsoft.com/office/drawing/2010/main" xmlns:m="http://schemas.openxmlformats.org/officeDocument/2006/math" xmlns="" val="1"/>
+              <ma14:wrappingTextBoxFlag xmlns="" xmlns:m="http://schemas.openxmlformats.org/officeDocument/2006/math" xmlns:a14="http://schemas.microsoft.com/office/drawing/2010/main" xmlns:ma14="http://schemas.microsoft.com/office/mac/drawingml/2011/main" val="1"/>
             </a:ext>
           </a:extLst>
         </p:spPr>
@@ -4591,7 +4596,7 @@
           </a:ln>
           <a:extLst>
             <a:ext uri="{C572A759-6A51-4108-AA02-DFA0A04FC94B}">
-              <ma14:wrappingTextBoxFlag xmlns:ma14="http://schemas.microsoft.com/office/mac/drawingml/2011/main" xmlns:a14="http://schemas.microsoft.com/office/drawing/2010/main" xmlns:m="http://schemas.openxmlformats.org/officeDocument/2006/math" xmlns="" val="1"/>
+              <ma14:wrappingTextBoxFlag xmlns="" xmlns:m="http://schemas.openxmlformats.org/officeDocument/2006/math" xmlns:a14="http://schemas.microsoft.com/office/drawing/2010/main" xmlns:ma14="http://schemas.microsoft.com/office/mac/drawingml/2011/main" val="1"/>
             </a:ext>
           </a:extLst>
         </p:spPr>
@@ -4635,7 +4640,7 @@
           </a:ln>
           <a:extLst>
             <a:ext uri="{C572A759-6A51-4108-AA02-DFA0A04FC94B}">
-              <ma14:wrappingTextBoxFlag xmlns:ma14="http://schemas.microsoft.com/office/mac/drawingml/2011/main" xmlns:a14="http://schemas.microsoft.com/office/drawing/2010/main" xmlns:m="http://schemas.openxmlformats.org/officeDocument/2006/math" xmlns="" val="1"/>
+              <ma14:wrappingTextBoxFlag xmlns="" xmlns:m="http://schemas.openxmlformats.org/officeDocument/2006/math" xmlns:a14="http://schemas.microsoft.com/office/drawing/2010/main" xmlns:ma14="http://schemas.microsoft.com/office/mac/drawingml/2011/main" val="1"/>
             </a:ext>
           </a:extLst>
         </p:spPr>
@@ -4817,7 +4822,7 @@
           </a:ln>
           <a:extLst>
             <a:ext uri="{C572A759-6A51-4108-AA02-DFA0A04FC94B}">
-              <ma14:wrappingTextBoxFlag xmlns:ma14="http://schemas.microsoft.com/office/mac/drawingml/2011/main" xmlns:a14="http://schemas.microsoft.com/office/drawing/2010/main" xmlns:m="http://schemas.openxmlformats.org/officeDocument/2006/math" xmlns="" val="1"/>
+              <ma14:wrappingTextBoxFlag xmlns="" xmlns:m="http://schemas.openxmlformats.org/officeDocument/2006/math" xmlns:a14="http://schemas.microsoft.com/office/drawing/2010/main" xmlns:ma14="http://schemas.microsoft.com/office/mac/drawingml/2011/main" val="1"/>
             </a:ext>
           </a:extLst>
         </p:spPr>
@@ -4861,7 +4866,7 @@
           </a:ln>
           <a:extLst>
             <a:ext uri="{C572A759-6A51-4108-AA02-DFA0A04FC94B}">
-              <ma14:wrappingTextBoxFlag xmlns:ma14="http://schemas.microsoft.com/office/mac/drawingml/2011/main" xmlns:a14="http://schemas.microsoft.com/office/drawing/2010/main" xmlns:m="http://schemas.openxmlformats.org/officeDocument/2006/math" xmlns="" val="1"/>
+              <ma14:wrappingTextBoxFlag xmlns="" xmlns:m="http://schemas.openxmlformats.org/officeDocument/2006/math" xmlns:a14="http://schemas.microsoft.com/office/drawing/2010/main" xmlns:ma14="http://schemas.microsoft.com/office/mac/drawingml/2011/main" val="1"/>
             </a:ext>
           </a:extLst>
         </p:spPr>
@@ -4989,7 +4994,7 @@
           </a:ln>
           <a:extLst>
             <a:ext uri="{C572A759-6A51-4108-AA02-DFA0A04FC94B}">
-              <ma14:wrappingTextBoxFlag xmlns:ma14="http://schemas.microsoft.com/office/mac/drawingml/2011/main" xmlns:a14="http://schemas.microsoft.com/office/drawing/2010/main" xmlns:m="http://schemas.openxmlformats.org/officeDocument/2006/math" xmlns="" val="1"/>
+              <ma14:wrappingTextBoxFlag xmlns="" xmlns:m="http://schemas.openxmlformats.org/officeDocument/2006/math" xmlns:a14="http://schemas.microsoft.com/office/drawing/2010/main" xmlns:ma14="http://schemas.microsoft.com/office/mac/drawingml/2011/main" val="1"/>
             </a:ext>
           </a:extLst>
         </p:spPr>
@@ -5028,7 +5033,7 @@
           </a:ln>
           <a:extLst>
             <a:ext uri="{C572A759-6A51-4108-AA02-DFA0A04FC94B}">
-              <ma14:wrappingTextBoxFlag xmlns:ma14="http://schemas.microsoft.com/office/mac/drawingml/2011/main" xmlns:a14="http://schemas.microsoft.com/office/drawing/2010/main" xmlns:m="http://schemas.openxmlformats.org/officeDocument/2006/math" xmlns="" val="1"/>
+              <ma14:wrappingTextBoxFlag xmlns="" xmlns:m="http://schemas.openxmlformats.org/officeDocument/2006/math" xmlns:a14="http://schemas.microsoft.com/office/drawing/2010/main" xmlns:ma14="http://schemas.microsoft.com/office/mac/drawingml/2011/main" val="1"/>
             </a:ext>
           </a:extLst>
         </p:spPr>
@@ -5099,7 +5104,7 @@
           </a:ln>
           <a:extLst>
             <a:ext uri="{C572A759-6A51-4108-AA02-DFA0A04FC94B}">
-              <ma14:wrappingTextBoxFlag xmlns:ma14="http://schemas.microsoft.com/office/mac/drawingml/2011/main" xmlns:a14="http://schemas.microsoft.com/office/drawing/2010/main" xmlns:m="http://schemas.openxmlformats.org/officeDocument/2006/math" xmlns="" val="1"/>
+              <ma14:wrappingTextBoxFlag xmlns="" xmlns:m="http://schemas.openxmlformats.org/officeDocument/2006/math" xmlns:a14="http://schemas.microsoft.com/office/drawing/2010/main" xmlns:ma14="http://schemas.microsoft.com/office/mac/drawingml/2011/main" val="1"/>
             </a:ext>
           </a:extLst>
         </p:spPr>
@@ -5134,7 +5139,7 @@
           </a:ln>
           <a:extLst>
             <a:ext uri="{C572A759-6A51-4108-AA02-DFA0A04FC94B}">
-              <ma14:wrappingTextBoxFlag xmlns:ma14="http://schemas.microsoft.com/office/mac/drawingml/2011/main" xmlns:a14="http://schemas.microsoft.com/office/drawing/2010/main" xmlns:m="http://schemas.openxmlformats.org/officeDocument/2006/math" xmlns="" val="1"/>
+              <ma14:wrappingTextBoxFlag xmlns="" xmlns:m="http://schemas.openxmlformats.org/officeDocument/2006/math" xmlns:a14="http://schemas.microsoft.com/office/drawing/2010/main" xmlns:ma14="http://schemas.microsoft.com/office/mac/drawingml/2011/main" val="1"/>
             </a:ext>
           </a:extLst>
         </p:spPr>
@@ -5169,7 +5174,7 @@
           </a:ln>
           <a:extLst>
             <a:ext uri="{C572A759-6A51-4108-AA02-DFA0A04FC94B}">
-              <ma14:wrappingTextBoxFlag xmlns:ma14="http://schemas.microsoft.com/office/mac/drawingml/2011/main" xmlns:a14="http://schemas.microsoft.com/office/drawing/2010/main" xmlns:m="http://schemas.openxmlformats.org/officeDocument/2006/math" xmlns="" val="1"/>
+              <ma14:wrappingTextBoxFlag xmlns="" xmlns:m="http://schemas.openxmlformats.org/officeDocument/2006/math" xmlns:a14="http://schemas.microsoft.com/office/drawing/2010/main" xmlns:ma14="http://schemas.microsoft.com/office/mac/drawingml/2011/main" val="1"/>
             </a:ext>
           </a:extLst>
         </p:spPr>
@@ -5204,7 +5209,7 @@
           </a:ln>
           <a:extLst>
             <a:ext uri="{C572A759-6A51-4108-AA02-DFA0A04FC94B}">
-              <ma14:wrappingTextBoxFlag xmlns:ma14="http://schemas.microsoft.com/office/mac/drawingml/2011/main" xmlns:a14="http://schemas.microsoft.com/office/drawing/2010/main" xmlns:m="http://schemas.openxmlformats.org/officeDocument/2006/math" xmlns="" val="1"/>
+              <ma14:wrappingTextBoxFlag xmlns="" xmlns:m="http://schemas.openxmlformats.org/officeDocument/2006/math" xmlns:a14="http://schemas.microsoft.com/office/drawing/2010/main" xmlns:ma14="http://schemas.microsoft.com/office/mac/drawingml/2011/main" val="1"/>
             </a:ext>
           </a:extLst>
         </p:spPr>
@@ -5265,7 +5270,7 @@
           </a:ln>
           <a:extLst>
             <a:ext uri="{C572A759-6A51-4108-AA02-DFA0A04FC94B}">
-              <ma14:wrappingTextBoxFlag xmlns:ma14="http://schemas.microsoft.com/office/mac/drawingml/2011/main" xmlns:a14="http://schemas.microsoft.com/office/drawing/2010/main" xmlns:m="http://schemas.openxmlformats.org/officeDocument/2006/math" xmlns="" val="1"/>
+              <ma14:wrappingTextBoxFlag xmlns="" xmlns:m="http://schemas.openxmlformats.org/officeDocument/2006/math" xmlns:a14="http://schemas.microsoft.com/office/drawing/2010/main" xmlns:ma14="http://schemas.microsoft.com/office/mac/drawingml/2011/main" val="1"/>
             </a:ext>
           </a:extLst>
         </p:spPr>
@@ -5304,7 +5309,7 @@
           </a:ln>
           <a:extLst>
             <a:ext uri="{C572A759-6A51-4108-AA02-DFA0A04FC94B}">
-              <ma14:wrappingTextBoxFlag xmlns:ma14="http://schemas.microsoft.com/office/mac/drawingml/2011/main" xmlns:a14="http://schemas.microsoft.com/office/drawing/2010/main" xmlns:m="http://schemas.openxmlformats.org/officeDocument/2006/math" xmlns="" val="1"/>
+              <ma14:wrappingTextBoxFlag xmlns="" xmlns:m="http://schemas.openxmlformats.org/officeDocument/2006/math" xmlns:a14="http://schemas.microsoft.com/office/drawing/2010/main" xmlns:ma14="http://schemas.microsoft.com/office/mac/drawingml/2011/main" val="1"/>
             </a:ext>
           </a:extLst>
         </p:spPr>
@@ -5343,7 +5348,7 @@
           </a:ln>
           <a:extLst>
             <a:ext uri="{C572A759-6A51-4108-AA02-DFA0A04FC94B}">
-              <ma14:wrappingTextBoxFlag xmlns:ma14="http://schemas.microsoft.com/office/mac/drawingml/2011/main" xmlns:a14="http://schemas.microsoft.com/office/drawing/2010/main" xmlns:m="http://schemas.openxmlformats.org/officeDocument/2006/math" xmlns="" val="1"/>
+              <ma14:wrappingTextBoxFlag xmlns="" xmlns:m="http://schemas.openxmlformats.org/officeDocument/2006/math" xmlns:a14="http://schemas.microsoft.com/office/drawing/2010/main" xmlns:ma14="http://schemas.microsoft.com/office/mac/drawingml/2011/main" val="1"/>
             </a:ext>
           </a:extLst>
         </p:spPr>
@@ -5382,7 +5387,7 @@
           </a:ln>
           <a:extLst>
             <a:ext uri="{C572A759-6A51-4108-AA02-DFA0A04FC94B}">
-              <ma14:wrappingTextBoxFlag xmlns:ma14="http://schemas.microsoft.com/office/mac/drawingml/2011/main" xmlns:a14="http://schemas.microsoft.com/office/drawing/2010/main" xmlns:m="http://schemas.openxmlformats.org/officeDocument/2006/math" xmlns="" val="1"/>
+              <ma14:wrappingTextBoxFlag xmlns="" xmlns:m="http://schemas.openxmlformats.org/officeDocument/2006/math" xmlns:a14="http://schemas.microsoft.com/office/drawing/2010/main" xmlns:ma14="http://schemas.microsoft.com/office/mac/drawingml/2011/main" val="1"/>
             </a:ext>
           </a:extLst>
         </p:spPr>
@@ -5421,7 +5426,7 @@
           </a:ln>
           <a:extLst>
             <a:ext uri="{C572A759-6A51-4108-AA02-DFA0A04FC94B}">
-              <ma14:wrappingTextBoxFlag xmlns:ma14="http://schemas.microsoft.com/office/mac/drawingml/2011/main" xmlns:a14="http://schemas.microsoft.com/office/drawing/2010/main" xmlns:m="http://schemas.openxmlformats.org/officeDocument/2006/math" xmlns="" val="1"/>
+              <ma14:wrappingTextBoxFlag xmlns="" xmlns:m="http://schemas.openxmlformats.org/officeDocument/2006/math" xmlns:a14="http://schemas.microsoft.com/office/drawing/2010/main" xmlns:ma14="http://schemas.microsoft.com/office/mac/drawingml/2011/main" val="1"/>
             </a:ext>
           </a:extLst>
         </p:spPr>
@@ -5576,7 +5581,7 @@
           </a:ln>
           <a:extLst>
             <a:ext uri="{C572A759-6A51-4108-AA02-DFA0A04FC94B}">
-              <ma14:wrappingTextBoxFlag xmlns:ma14="http://schemas.microsoft.com/office/mac/drawingml/2011/main" xmlns:a14="http://schemas.microsoft.com/office/drawing/2010/main" xmlns:m="http://schemas.openxmlformats.org/officeDocument/2006/math" xmlns="" val="1"/>
+              <ma14:wrappingTextBoxFlag xmlns="" xmlns:m="http://schemas.openxmlformats.org/officeDocument/2006/math" xmlns:a14="http://schemas.microsoft.com/office/drawing/2010/main" xmlns:ma14="http://schemas.microsoft.com/office/mac/drawingml/2011/main" val="1"/>
             </a:ext>
           </a:extLst>
         </p:spPr>
@@ -5615,7 +5620,7 @@
           </a:ln>
           <a:extLst>
             <a:ext uri="{C572A759-6A51-4108-AA02-DFA0A04FC94B}">
-              <ma14:wrappingTextBoxFlag xmlns:ma14="http://schemas.microsoft.com/office/mac/drawingml/2011/main" xmlns:a14="http://schemas.microsoft.com/office/drawing/2010/main" xmlns:m="http://schemas.openxmlformats.org/officeDocument/2006/math" xmlns="" val="1"/>
+              <ma14:wrappingTextBoxFlag xmlns="" xmlns:m="http://schemas.openxmlformats.org/officeDocument/2006/math" xmlns:a14="http://schemas.microsoft.com/office/drawing/2010/main" xmlns:ma14="http://schemas.microsoft.com/office/mac/drawingml/2011/main" val="1"/>
             </a:ext>
           </a:extLst>
         </p:spPr>
@@ -5654,7 +5659,7 @@
           </a:ln>
           <a:extLst>
             <a:ext uri="{C572A759-6A51-4108-AA02-DFA0A04FC94B}">
-              <ma14:wrappingTextBoxFlag xmlns:ma14="http://schemas.microsoft.com/office/mac/drawingml/2011/main" xmlns:a14="http://schemas.microsoft.com/office/drawing/2010/main" xmlns:m="http://schemas.openxmlformats.org/officeDocument/2006/math" xmlns="" val="1"/>
+              <ma14:wrappingTextBoxFlag xmlns="" xmlns:m="http://schemas.openxmlformats.org/officeDocument/2006/math" xmlns:a14="http://schemas.microsoft.com/office/drawing/2010/main" xmlns:ma14="http://schemas.microsoft.com/office/mac/drawingml/2011/main" val="1"/>
             </a:ext>
           </a:extLst>
         </p:spPr>
@@ -5693,7 +5698,7 @@
           </a:ln>
           <a:extLst>
             <a:ext uri="{C572A759-6A51-4108-AA02-DFA0A04FC94B}">
-              <ma14:wrappingTextBoxFlag xmlns:ma14="http://schemas.microsoft.com/office/mac/drawingml/2011/main" xmlns:a14="http://schemas.microsoft.com/office/drawing/2010/main" xmlns:m="http://schemas.openxmlformats.org/officeDocument/2006/math" xmlns="" val="1"/>
+              <ma14:wrappingTextBoxFlag xmlns="" xmlns:m="http://schemas.openxmlformats.org/officeDocument/2006/math" xmlns:a14="http://schemas.microsoft.com/office/drawing/2010/main" xmlns:ma14="http://schemas.microsoft.com/office/mac/drawingml/2011/main" val="1"/>
             </a:ext>
           </a:extLst>
         </p:spPr>
@@ -5732,7 +5737,7 @@
           </a:ln>
           <a:extLst>
             <a:ext uri="{C572A759-6A51-4108-AA02-DFA0A04FC94B}">
-              <ma14:wrappingTextBoxFlag xmlns:ma14="http://schemas.microsoft.com/office/mac/drawingml/2011/main" xmlns:a14="http://schemas.microsoft.com/office/drawing/2010/main" xmlns:m="http://schemas.openxmlformats.org/officeDocument/2006/math" xmlns="" val="1"/>
+              <ma14:wrappingTextBoxFlag xmlns="" xmlns:m="http://schemas.openxmlformats.org/officeDocument/2006/math" xmlns:a14="http://schemas.microsoft.com/office/drawing/2010/main" xmlns:ma14="http://schemas.microsoft.com/office/mac/drawingml/2011/main" val="1"/>
             </a:ext>
           </a:extLst>
         </p:spPr>
@@ -5771,7 +5776,7 @@
           </a:ln>
           <a:extLst>
             <a:ext uri="{C572A759-6A51-4108-AA02-DFA0A04FC94B}">
-              <ma14:wrappingTextBoxFlag xmlns:ma14="http://schemas.microsoft.com/office/mac/drawingml/2011/main" xmlns:a14="http://schemas.microsoft.com/office/drawing/2010/main" xmlns:m="http://schemas.openxmlformats.org/officeDocument/2006/math" xmlns="" val="1"/>
+              <ma14:wrappingTextBoxFlag xmlns="" xmlns:m="http://schemas.openxmlformats.org/officeDocument/2006/math" xmlns:a14="http://schemas.microsoft.com/office/drawing/2010/main" xmlns:ma14="http://schemas.microsoft.com/office/mac/drawingml/2011/main" val="1"/>
             </a:ext>
           </a:extLst>
         </p:spPr>
@@ -5810,7 +5815,7 @@
           </a:ln>
           <a:extLst>
             <a:ext uri="{C572A759-6A51-4108-AA02-DFA0A04FC94B}">
-              <ma14:wrappingTextBoxFlag xmlns:ma14="http://schemas.microsoft.com/office/mac/drawingml/2011/main" xmlns:a14="http://schemas.microsoft.com/office/drawing/2010/main" xmlns:m="http://schemas.openxmlformats.org/officeDocument/2006/math" xmlns="" val="1"/>
+              <ma14:wrappingTextBoxFlag xmlns="" xmlns:m="http://schemas.openxmlformats.org/officeDocument/2006/math" xmlns:a14="http://schemas.microsoft.com/office/drawing/2010/main" xmlns:ma14="http://schemas.microsoft.com/office/mac/drawingml/2011/main" val="1"/>
             </a:ext>
           </a:extLst>
         </p:spPr>
@@ -5849,7 +5854,7 @@
           </a:ln>
           <a:extLst>
             <a:ext uri="{C572A759-6A51-4108-AA02-DFA0A04FC94B}">
-              <ma14:wrappingTextBoxFlag xmlns:ma14="http://schemas.microsoft.com/office/mac/drawingml/2011/main" xmlns:a14="http://schemas.microsoft.com/office/drawing/2010/main" xmlns:m="http://schemas.openxmlformats.org/officeDocument/2006/math" xmlns="" val="1"/>
+              <ma14:wrappingTextBoxFlag xmlns="" xmlns:m="http://schemas.openxmlformats.org/officeDocument/2006/math" xmlns:a14="http://schemas.microsoft.com/office/drawing/2010/main" xmlns:ma14="http://schemas.microsoft.com/office/mac/drawingml/2011/main" val="1"/>
             </a:ext>
           </a:extLst>
         </p:spPr>
@@ -5888,7 +5893,7 @@
           </a:ln>
           <a:extLst>
             <a:ext uri="{C572A759-6A51-4108-AA02-DFA0A04FC94B}">
-              <ma14:wrappingTextBoxFlag xmlns:ma14="http://schemas.microsoft.com/office/mac/drawingml/2011/main" xmlns:a14="http://schemas.microsoft.com/office/drawing/2010/main" xmlns:m="http://schemas.openxmlformats.org/officeDocument/2006/math" xmlns="" val="1"/>
+              <ma14:wrappingTextBoxFlag xmlns="" xmlns:m="http://schemas.openxmlformats.org/officeDocument/2006/math" xmlns:a14="http://schemas.microsoft.com/office/drawing/2010/main" xmlns:ma14="http://schemas.microsoft.com/office/mac/drawingml/2011/main" val="1"/>
             </a:ext>
           </a:extLst>
         </p:spPr>
@@ -5949,7 +5954,7 @@
         </p:nvSpPr>
         <p:spPr>
           <a:xfrm>
-            <a:off x="9329927" y="823751"/>
+            <a:off x="9266133" y="-404216"/>
             <a:ext cx="5262983" cy="808432"/>
           </a:xfrm>
           <a:prstGeom prst="rect">
@@ -5960,7 +5965,7 @@
           </a:ln>
           <a:extLst>
             <a:ext uri="{C572A759-6A51-4108-AA02-DFA0A04FC94B}">
-              <ma14:wrappingTextBoxFlag xmlns:ma14="http://schemas.microsoft.com/office/mac/drawingml/2011/main" xmlns:a14="http://schemas.microsoft.com/office/drawing/2010/main" xmlns:m="http://schemas.openxmlformats.org/officeDocument/2006/math" xmlns="" val="1"/>
+              <ma14:wrappingTextBoxFlag xmlns="" xmlns:m="http://schemas.openxmlformats.org/officeDocument/2006/math" xmlns:a14="http://schemas.microsoft.com/office/drawing/2010/main" xmlns:ma14="http://schemas.microsoft.com/office/mac/drawingml/2011/main" val="1"/>
             </a:ext>
           </a:extLst>
         </p:spPr>
@@ -5978,6 +5983,7 @@
           </a:lstStyle>
           <a:p>
             <a:r>
+              <a:rPr dirty="0"/>
               <a:t>Getting data into R</a:t>
             </a:r>
           </a:p>
@@ -6002,7 +6008,7 @@
           </a:ln>
           <a:extLst>
             <a:ext uri="{C572A759-6A51-4108-AA02-DFA0A04FC94B}">
-              <ma14:wrappingTextBoxFlag xmlns:ma14="http://schemas.microsoft.com/office/mac/drawingml/2011/main" xmlns:a14="http://schemas.microsoft.com/office/drawing/2010/main" xmlns:m="http://schemas.openxmlformats.org/officeDocument/2006/math" xmlns="" val="1"/>
+              <ma14:wrappingTextBoxFlag xmlns="" xmlns:m="http://schemas.openxmlformats.org/officeDocument/2006/math" xmlns:a14="http://schemas.microsoft.com/office/drawing/2010/main" xmlns:ma14="http://schemas.microsoft.com/office/mac/drawingml/2011/main" val="1"/>
             </a:ext>
           </a:extLst>
         </p:spPr>
@@ -6016,7 +6022,28 @@
               <a:defRPr sz="3600"/>
             </a:pPr>
             <a:r>
-              <a:t>df &lt;- read_csv(‘somefile.csv’) </a:t>
+              <a:rPr dirty="0" err="1"/>
+              <a:t>df</a:t>
+            </a:r>
+            <a:r>
+              <a:rPr dirty="0"/>
+              <a:t> &lt;- </a:t>
+            </a:r>
+            <a:r>
+              <a:rPr dirty="0" err="1"/>
+              <a:t>read_csv</a:t>
+            </a:r>
+            <a:r>
+              <a:rPr dirty="0"/>
+              <a:t>(‘</a:t>
+            </a:r>
+            <a:r>
+              <a:rPr dirty="0" err="1"/>
+              <a:t>somefile.csv</a:t>
+            </a:r>
+            <a:r>
+              <a:rPr dirty="0"/>
+              <a:t>’) </a:t>
             </a:r>
           </a:p>
           <a:p>
@@ -6024,7 +6051,28 @@
               <a:defRPr sz="3600"/>
             </a:pPr>
             <a:r>
-              <a:t>df &lt;- read_tsv(‘somefile.tsv’)</a:t>
+              <a:rPr dirty="0" err="1"/>
+              <a:t>df</a:t>
+            </a:r>
+            <a:r>
+              <a:rPr dirty="0"/>
+              <a:t> &lt;- </a:t>
+            </a:r>
+            <a:r>
+              <a:rPr dirty="0" err="1"/>
+              <a:t>read_tsv</a:t>
+            </a:r>
+            <a:r>
+              <a:rPr dirty="0"/>
+              <a:t>(‘</a:t>
+            </a:r>
+            <a:r>
+              <a:rPr dirty="0" err="1"/>
+              <a:t>somefile.tsv</a:t>
+            </a:r>
+            <a:r>
+              <a:rPr dirty="0"/>
+              <a:t>’)</a:t>
             </a:r>
           </a:p>
           <a:p>
@@ -6032,7 +6080,36 @@
               <a:defRPr sz="3600"/>
             </a:pPr>
             <a:r>
-              <a:t>df &lt;- read_table(‘somefile.tsv’, sep = “\t”) </a:t>
+              <a:rPr dirty="0" err="1"/>
+              <a:t>df</a:t>
+            </a:r>
+            <a:r>
+              <a:rPr dirty="0"/>
+              <a:t> &lt;- </a:t>
+            </a:r>
+            <a:r>
+              <a:rPr dirty="0" err="1"/>
+              <a:t>read_table</a:t>
+            </a:r>
+            <a:r>
+              <a:rPr dirty="0"/>
+              <a:t>(‘</a:t>
+            </a:r>
+            <a:r>
+              <a:rPr dirty="0" err="1"/>
+              <a:t>somefile.tsv</a:t>
+            </a:r>
+            <a:r>
+              <a:rPr dirty="0"/>
+              <a:t>’, </a:t>
+            </a:r>
+            <a:r>
+              <a:rPr dirty="0" err="1"/>
+              <a:t>sep</a:t>
+            </a:r>
+            <a:r>
+              <a:rPr dirty="0"/>
+              <a:t> = “\t”) </a:t>
             </a:r>
           </a:p>
           <a:p>
@@ -6040,7 +6117,28 @@
               <a:defRPr sz="3600"/>
             </a:pPr>
             <a:r>
-              <a:t>df &lt;- read.csv(‘somefile.csv’) </a:t>
+              <a:rPr dirty="0" err="1"/>
+              <a:t>df</a:t>
+            </a:r>
+            <a:r>
+              <a:rPr dirty="0"/>
+              <a:t> &lt;- </a:t>
+            </a:r>
+            <a:r>
+              <a:rPr dirty="0" err="1"/>
+              <a:t>read.csv</a:t>
+            </a:r>
+            <a:r>
+              <a:rPr dirty="0"/>
+              <a:t>(‘</a:t>
+            </a:r>
+            <a:r>
+              <a:rPr dirty="0" err="1"/>
+              <a:t>somefile.csv</a:t>
+            </a:r>
+            <a:r>
+              <a:rPr dirty="0"/>
+              <a:t>’) </a:t>
             </a:r>
           </a:p>
         </p:txBody>
@@ -6064,7 +6162,7 @@
           </a:ln>
           <a:extLst>
             <a:ext uri="{C572A759-6A51-4108-AA02-DFA0A04FC94B}">
-              <ma14:wrappingTextBoxFlag xmlns:ma14="http://schemas.microsoft.com/office/mac/drawingml/2011/main" xmlns:a14="http://schemas.microsoft.com/office/drawing/2010/main" xmlns:m="http://schemas.openxmlformats.org/officeDocument/2006/math" xmlns="" val="1"/>
+              <ma14:wrappingTextBoxFlag xmlns="" xmlns:m="http://schemas.openxmlformats.org/officeDocument/2006/math" xmlns:a14="http://schemas.microsoft.com/office/drawing/2010/main" xmlns:ma14="http://schemas.microsoft.com/office/mac/drawingml/2011/main" val="1"/>
             </a:ext>
           </a:extLst>
         </p:spPr>
@@ -6099,7 +6197,7 @@
           </a:ln>
           <a:extLst>
             <a:ext uri="{C572A759-6A51-4108-AA02-DFA0A04FC94B}">
-              <ma14:wrappingTextBoxFlag xmlns:ma14="http://schemas.microsoft.com/office/mac/drawingml/2011/main" xmlns:a14="http://schemas.microsoft.com/office/drawing/2010/main" xmlns:m="http://schemas.openxmlformats.org/officeDocument/2006/math" xmlns="" val="1"/>
+              <ma14:wrappingTextBoxFlag xmlns="" xmlns:m="http://schemas.openxmlformats.org/officeDocument/2006/math" xmlns:a14="http://schemas.microsoft.com/office/drawing/2010/main" xmlns:ma14="http://schemas.microsoft.com/office/mac/drawingml/2011/main" val="1"/>
             </a:ext>
           </a:extLst>
         </p:spPr>
@@ -6189,7 +6287,7 @@
           </a:ln>
           <a:extLst>
             <a:ext uri="{C572A759-6A51-4108-AA02-DFA0A04FC94B}">
-              <ma14:wrappingTextBoxFlag xmlns:ma14="http://schemas.microsoft.com/office/mac/drawingml/2011/main" xmlns:a14="http://schemas.microsoft.com/office/drawing/2010/main" xmlns:m="http://schemas.openxmlformats.org/officeDocument/2006/math" xmlns="" val="1"/>
+              <ma14:wrappingTextBoxFlag xmlns="" xmlns:m="http://schemas.openxmlformats.org/officeDocument/2006/math" xmlns:a14="http://schemas.microsoft.com/office/drawing/2010/main" xmlns:ma14="http://schemas.microsoft.com/office/mac/drawingml/2011/main" val="1"/>
             </a:ext>
           </a:extLst>
         </p:spPr>
@@ -6231,7 +6329,7 @@
           </a:ln>
           <a:extLst>
             <a:ext uri="{C572A759-6A51-4108-AA02-DFA0A04FC94B}">
-              <ma14:wrappingTextBoxFlag xmlns:ma14="http://schemas.microsoft.com/office/mac/drawingml/2011/main" xmlns:a14="http://schemas.microsoft.com/office/drawing/2010/main" xmlns:m="http://schemas.openxmlformats.org/officeDocument/2006/math" xmlns="" val="1"/>
+              <ma14:wrappingTextBoxFlag xmlns="" xmlns:m="http://schemas.openxmlformats.org/officeDocument/2006/math" xmlns:a14="http://schemas.microsoft.com/office/drawing/2010/main" xmlns:ma14="http://schemas.microsoft.com/office/mac/drawingml/2011/main" val="1"/>
             </a:ext>
           </a:extLst>
         </p:spPr>
@@ -6285,7 +6383,7 @@
           </a:ln>
           <a:extLst>
             <a:ext uri="{C572A759-6A51-4108-AA02-DFA0A04FC94B}">
-              <ma14:wrappingTextBoxFlag xmlns:ma14="http://schemas.microsoft.com/office/mac/drawingml/2011/main" xmlns:a14="http://schemas.microsoft.com/office/drawing/2010/main" xmlns:m="http://schemas.openxmlformats.org/officeDocument/2006/math" xmlns="" val="1"/>
+              <ma14:wrappingTextBoxFlag xmlns="" xmlns:m="http://schemas.openxmlformats.org/officeDocument/2006/math" xmlns:a14="http://schemas.microsoft.com/office/drawing/2010/main" xmlns:ma14="http://schemas.microsoft.com/office/mac/drawingml/2011/main" val="1"/>
             </a:ext>
           </a:extLst>
         </p:spPr>
@@ -6332,7 +6430,7 @@
           </a:ln>
           <a:extLst>
             <a:ext uri="{C572A759-6A51-4108-AA02-DFA0A04FC94B}">
-              <ma14:wrappingTextBoxFlag xmlns:ma14="http://schemas.microsoft.com/office/mac/drawingml/2011/main" xmlns:a14="http://schemas.microsoft.com/office/drawing/2010/main" xmlns:m="http://schemas.openxmlformats.org/officeDocument/2006/math" xmlns="" val="1"/>
+              <ma14:wrappingTextBoxFlag xmlns="" xmlns:m="http://schemas.openxmlformats.org/officeDocument/2006/math" xmlns:a14="http://schemas.microsoft.com/office/drawing/2010/main" xmlns:ma14="http://schemas.microsoft.com/office/mac/drawingml/2011/main" val="1"/>
             </a:ext>
           </a:extLst>
         </p:spPr>
@@ -6379,7 +6477,7 @@
           </a:ln>
           <a:extLst>
             <a:ext uri="{C572A759-6A51-4108-AA02-DFA0A04FC94B}">
-              <ma14:wrappingTextBoxFlag xmlns:ma14="http://schemas.microsoft.com/office/mac/drawingml/2011/main" xmlns:a14="http://schemas.microsoft.com/office/drawing/2010/main" xmlns:m="http://schemas.openxmlformats.org/officeDocument/2006/math" xmlns="" val="1"/>
+              <ma14:wrappingTextBoxFlag xmlns="" xmlns:m="http://schemas.openxmlformats.org/officeDocument/2006/math" xmlns:a14="http://schemas.microsoft.com/office/drawing/2010/main" xmlns:ma14="http://schemas.microsoft.com/office/mac/drawingml/2011/main" val="1"/>
             </a:ext>
           </a:extLst>
         </p:spPr>
@@ -6416,7 +6514,7 @@
           </a:ln>
           <a:extLst>
             <a:ext uri="{C572A759-6A51-4108-AA02-DFA0A04FC94B}">
-              <ma14:wrappingTextBoxFlag xmlns:ma14="http://schemas.microsoft.com/office/mac/drawingml/2011/main" xmlns:a14="http://schemas.microsoft.com/office/drawing/2010/main" xmlns:m="http://schemas.openxmlformats.org/officeDocument/2006/math" xmlns="" val="1"/>
+              <ma14:wrappingTextBoxFlag xmlns="" xmlns:m="http://schemas.openxmlformats.org/officeDocument/2006/math" xmlns:a14="http://schemas.microsoft.com/office/drawing/2010/main" xmlns:ma14="http://schemas.microsoft.com/office/mac/drawingml/2011/main" val="1"/>
             </a:ext>
           </a:extLst>
         </p:spPr>
@@ -6453,7 +6551,7 @@
           </a:ln>
           <a:extLst>
             <a:ext uri="{C572A759-6A51-4108-AA02-DFA0A04FC94B}">
-              <ma14:wrappingTextBoxFlag xmlns:ma14="http://schemas.microsoft.com/office/mac/drawingml/2011/main" xmlns:a14="http://schemas.microsoft.com/office/drawing/2010/main" xmlns:m="http://schemas.openxmlformats.org/officeDocument/2006/math" xmlns="" val="1"/>
+              <ma14:wrappingTextBoxFlag xmlns="" xmlns:m="http://schemas.openxmlformats.org/officeDocument/2006/math" xmlns:a14="http://schemas.microsoft.com/office/drawing/2010/main" xmlns:ma14="http://schemas.microsoft.com/office/mac/drawingml/2011/main" val="1"/>
             </a:ext>
           </a:extLst>
         </p:spPr>
@@ -6499,7 +6597,7 @@
           </a:ln>
           <a:extLst>
             <a:ext uri="{C572A759-6A51-4108-AA02-DFA0A04FC94B}">
-              <ma14:wrappingTextBoxFlag xmlns:ma14="http://schemas.microsoft.com/office/mac/drawingml/2011/main" xmlns:a14="http://schemas.microsoft.com/office/drawing/2010/main" xmlns:m="http://schemas.openxmlformats.org/officeDocument/2006/math" xmlns="" val="1"/>
+              <ma14:wrappingTextBoxFlag xmlns="" xmlns:m="http://schemas.openxmlformats.org/officeDocument/2006/math" xmlns:a14="http://schemas.microsoft.com/office/drawing/2010/main" xmlns:ma14="http://schemas.microsoft.com/office/mac/drawingml/2011/main" val="1"/>
             </a:ext>
           </a:extLst>
         </p:spPr>
@@ -6564,7 +6662,7 @@
           </a:ln>
           <a:extLst>
             <a:ext uri="{C572A759-6A51-4108-AA02-DFA0A04FC94B}">
-              <ma14:wrappingTextBoxFlag xmlns:ma14="http://schemas.microsoft.com/office/mac/drawingml/2011/main" xmlns:a14="http://schemas.microsoft.com/office/drawing/2010/main" xmlns:m="http://schemas.openxmlformats.org/officeDocument/2006/math" xmlns="" val="1"/>
+              <ma14:wrappingTextBoxFlag xmlns="" xmlns:m="http://schemas.openxmlformats.org/officeDocument/2006/math" xmlns:a14="http://schemas.microsoft.com/office/drawing/2010/main" xmlns:ma14="http://schemas.microsoft.com/office/mac/drawingml/2011/main" val="1"/>
             </a:ext>
           </a:extLst>
         </p:spPr>
@@ -6603,7 +6701,7 @@
           </a:ln>
           <a:extLst>
             <a:ext uri="{C572A759-6A51-4108-AA02-DFA0A04FC94B}">
-              <ma14:wrappingTextBoxFlag xmlns:ma14="http://schemas.microsoft.com/office/mac/drawingml/2011/main" xmlns:a14="http://schemas.microsoft.com/office/drawing/2010/main" xmlns:m="http://schemas.openxmlformats.org/officeDocument/2006/math" xmlns="" val="1"/>
+              <ma14:wrappingTextBoxFlag xmlns="" xmlns:m="http://schemas.openxmlformats.org/officeDocument/2006/math" xmlns:a14="http://schemas.microsoft.com/office/drawing/2010/main" xmlns:ma14="http://schemas.microsoft.com/office/mac/drawingml/2011/main" val="1"/>
             </a:ext>
           </a:extLst>
         </p:spPr>
@@ -6673,7 +6771,7 @@
           </a:ln>
           <a:extLst>
             <a:ext uri="{C572A759-6A51-4108-AA02-DFA0A04FC94B}">
-              <ma14:wrappingTextBoxFlag xmlns:ma14="http://schemas.microsoft.com/office/mac/drawingml/2011/main" xmlns:a14="http://schemas.microsoft.com/office/drawing/2010/main" xmlns:m="http://schemas.openxmlformats.org/officeDocument/2006/math" xmlns="" val="1"/>
+              <ma14:wrappingTextBoxFlag xmlns="" xmlns:m="http://schemas.openxmlformats.org/officeDocument/2006/math" xmlns:a14="http://schemas.microsoft.com/office/drawing/2010/main" xmlns:ma14="http://schemas.microsoft.com/office/mac/drawingml/2011/main" val="1"/>
             </a:ext>
           </a:extLst>
         </p:spPr>
@@ -6820,7 +6918,7 @@
           </a:ln>
           <a:extLst>
             <a:ext uri="{C572A759-6A51-4108-AA02-DFA0A04FC94B}">
-              <ma14:wrappingTextBoxFlag xmlns:ma14="http://schemas.microsoft.com/office/mac/drawingml/2011/main" xmlns:a14="http://schemas.microsoft.com/office/drawing/2010/main" xmlns:m="http://schemas.openxmlformats.org/officeDocument/2006/math" xmlns="" val="1"/>
+              <ma14:wrappingTextBoxFlag xmlns="" xmlns:m="http://schemas.openxmlformats.org/officeDocument/2006/math" xmlns:a14="http://schemas.microsoft.com/office/drawing/2010/main" xmlns:ma14="http://schemas.microsoft.com/office/mac/drawingml/2011/main" val="1"/>
             </a:ext>
           </a:extLst>
         </p:spPr>
@@ -6859,7 +6957,7 @@
           </a:ln>
           <a:extLst>
             <a:ext uri="{C572A759-6A51-4108-AA02-DFA0A04FC94B}">
-              <ma14:wrappingTextBoxFlag xmlns:ma14="http://schemas.microsoft.com/office/mac/drawingml/2011/main" xmlns:a14="http://schemas.microsoft.com/office/drawing/2010/main" xmlns:m="http://schemas.openxmlformats.org/officeDocument/2006/math" xmlns="" val="1"/>
+              <ma14:wrappingTextBoxFlag xmlns="" xmlns:m="http://schemas.openxmlformats.org/officeDocument/2006/math" xmlns:a14="http://schemas.microsoft.com/office/drawing/2010/main" xmlns:ma14="http://schemas.microsoft.com/office/mac/drawingml/2011/main" val="1"/>
             </a:ext>
           </a:extLst>
         </p:spPr>
@@ -6952,7 +7050,7 @@
           </a:ln>
           <a:extLst>
             <a:ext uri="{C572A759-6A51-4108-AA02-DFA0A04FC94B}">
-              <ma14:wrappingTextBoxFlag xmlns:ma14="http://schemas.microsoft.com/office/mac/drawingml/2011/main" xmlns:a14="http://schemas.microsoft.com/office/drawing/2010/main" xmlns:m="http://schemas.openxmlformats.org/officeDocument/2006/math" xmlns="" val="1"/>
+              <ma14:wrappingTextBoxFlag xmlns="" xmlns:m="http://schemas.openxmlformats.org/officeDocument/2006/math" xmlns:a14="http://schemas.microsoft.com/office/drawing/2010/main" xmlns:ma14="http://schemas.microsoft.com/office/mac/drawingml/2011/main" val="1"/>
             </a:ext>
           </a:extLst>
         </p:spPr>
@@ -7013,7 +7111,7 @@
           </a:ln>
           <a:extLst>
             <a:ext uri="{C572A759-6A51-4108-AA02-DFA0A04FC94B}">
-              <ma14:wrappingTextBoxFlag xmlns:ma14="http://schemas.microsoft.com/office/mac/drawingml/2011/main" xmlns:a14="http://schemas.microsoft.com/office/drawing/2010/main" xmlns:m="http://schemas.openxmlformats.org/officeDocument/2006/math" xmlns="" val="1"/>
+              <ma14:wrappingTextBoxFlag xmlns="" xmlns:m="http://schemas.openxmlformats.org/officeDocument/2006/math" xmlns:a14="http://schemas.microsoft.com/office/drawing/2010/main" xmlns:ma14="http://schemas.microsoft.com/office/mac/drawingml/2011/main" val="1"/>
             </a:ext>
           </a:extLst>
         </p:spPr>
@@ -7079,7 +7177,7 @@
           </a:ln>
           <a:extLst>
             <a:ext uri="{C572A759-6A51-4108-AA02-DFA0A04FC94B}">
-              <ma14:wrappingTextBoxFlag xmlns:ma14="http://schemas.microsoft.com/office/mac/drawingml/2011/main" xmlns:a14="http://schemas.microsoft.com/office/drawing/2010/main" xmlns:m="http://schemas.openxmlformats.org/officeDocument/2006/math" xmlns="" val="1"/>
+              <ma14:wrappingTextBoxFlag xmlns="" xmlns:m="http://schemas.openxmlformats.org/officeDocument/2006/math" xmlns:a14="http://schemas.microsoft.com/office/drawing/2010/main" xmlns:ma14="http://schemas.microsoft.com/office/mac/drawingml/2011/main" val="1"/>
             </a:ext>
           </a:extLst>
         </p:spPr>
@@ -7114,7 +7212,7 @@
           </a:ln>
           <a:extLst>
             <a:ext uri="{C572A759-6A51-4108-AA02-DFA0A04FC94B}">
-              <ma14:wrappingTextBoxFlag xmlns:ma14="http://schemas.microsoft.com/office/mac/drawingml/2011/main" xmlns:a14="http://schemas.microsoft.com/office/drawing/2010/main" xmlns:m="http://schemas.openxmlformats.org/officeDocument/2006/math" xmlns="" val="1"/>
+              <ma14:wrappingTextBoxFlag xmlns="" xmlns:m="http://schemas.openxmlformats.org/officeDocument/2006/math" xmlns:a14="http://schemas.microsoft.com/office/drawing/2010/main" xmlns:ma14="http://schemas.microsoft.com/office/mac/drawingml/2011/main" val="1"/>
             </a:ext>
           </a:extLst>
         </p:spPr>
@@ -7153,7 +7251,7 @@
           </a:ln>
           <a:extLst>
             <a:ext uri="{C572A759-6A51-4108-AA02-DFA0A04FC94B}">
-              <ma14:wrappingTextBoxFlag xmlns:ma14="http://schemas.microsoft.com/office/mac/drawingml/2011/main" xmlns:a14="http://schemas.microsoft.com/office/drawing/2010/main" xmlns:m="http://schemas.openxmlformats.org/officeDocument/2006/math" xmlns="" val="1"/>
+              <ma14:wrappingTextBoxFlag xmlns="" xmlns:m="http://schemas.openxmlformats.org/officeDocument/2006/math" xmlns:a14="http://schemas.microsoft.com/office/drawing/2010/main" xmlns:ma14="http://schemas.microsoft.com/office/mac/drawingml/2011/main" val="1"/>
             </a:ext>
           </a:extLst>
         </p:spPr>
@@ -7249,7 +7347,7 @@
           </a:ln>
           <a:extLst>
             <a:ext uri="{C572A759-6A51-4108-AA02-DFA0A04FC94B}">
-              <ma14:wrappingTextBoxFlag xmlns:ma14="http://schemas.microsoft.com/office/mac/drawingml/2011/main" xmlns:a14="http://schemas.microsoft.com/office/drawing/2010/main" xmlns:m="http://schemas.openxmlformats.org/officeDocument/2006/math" xmlns="" val="1"/>
+              <ma14:wrappingTextBoxFlag xmlns="" xmlns:m="http://schemas.openxmlformats.org/officeDocument/2006/math" xmlns:a14="http://schemas.microsoft.com/office/drawing/2010/main" xmlns:ma14="http://schemas.microsoft.com/office/mac/drawingml/2011/main" val="1"/>
             </a:ext>
           </a:extLst>
         </p:spPr>
@@ -7315,7 +7413,7 @@
           </a:ln>
           <a:extLst>
             <a:ext uri="{C572A759-6A51-4108-AA02-DFA0A04FC94B}">
-              <ma14:wrappingTextBoxFlag xmlns:ma14="http://schemas.microsoft.com/office/mac/drawingml/2011/main" xmlns:a14="http://schemas.microsoft.com/office/drawing/2010/main" xmlns:m="http://schemas.openxmlformats.org/officeDocument/2006/math" xmlns="" val="1"/>
+              <ma14:wrappingTextBoxFlag xmlns="" xmlns:m="http://schemas.openxmlformats.org/officeDocument/2006/math" xmlns:a14="http://schemas.microsoft.com/office/drawing/2010/main" xmlns:ma14="http://schemas.microsoft.com/office/mac/drawingml/2011/main" val="1"/>
             </a:ext>
           </a:extLst>
         </p:spPr>
@@ -7350,7 +7448,7 @@
           </a:ln>
           <a:extLst>
             <a:ext uri="{C572A759-6A51-4108-AA02-DFA0A04FC94B}">
-              <ma14:wrappingTextBoxFlag xmlns:ma14="http://schemas.microsoft.com/office/mac/drawingml/2011/main" xmlns:a14="http://schemas.microsoft.com/office/drawing/2010/main" xmlns:m="http://schemas.openxmlformats.org/officeDocument/2006/math" xmlns="" val="1"/>
+              <ma14:wrappingTextBoxFlag xmlns="" xmlns:m="http://schemas.openxmlformats.org/officeDocument/2006/math" xmlns:a14="http://schemas.microsoft.com/office/drawing/2010/main" xmlns:ma14="http://schemas.microsoft.com/office/mac/drawingml/2011/main" val="1"/>
             </a:ext>
           </a:extLst>
         </p:spPr>
@@ -7389,7 +7487,7 @@
           </a:ln>
           <a:extLst>
             <a:ext uri="{C572A759-6A51-4108-AA02-DFA0A04FC94B}">
-              <ma14:wrappingTextBoxFlag xmlns:ma14="http://schemas.microsoft.com/office/mac/drawingml/2011/main" xmlns:a14="http://schemas.microsoft.com/office/drawing/2010/main" xmlns:m="http://schemas.openxmlformats.org/officeDocument/2006/math" xmlns="" val="1"/>
+              <ma14:wrappingTextBoxFlag xmlns="" xmlns:m="http://schemas.openxmlformats.org/officeDocument/2006/math" xmlns:a14="http://schemas.microsoft.com/office/drawing/2010/main" xmlns:ma14="http://schemas.microsoft.com/office/mac/drawingml/2011/main" val="1"/>
             </a:ext>
           </a:extLst>
         </p:spPr>
@@ -7485,7 +7583,7 @@
           </a:ln>
           <a:extLst>
             <a:ext uri="{C572A759-6A51-4108-AA02-DFA0A04FC94B}">
-              <ma14:wrappingTextBoxFlag xmlns:ma14="http://schemas.microsoft.com/office/mac/drawingml/2011/main" xmlns:a14="http://schemas.microsoft.com/office/drawing/2010/main" xmlns:m="http://schemas.openxmlformats.org/officeDocument/2006/math" xmlns="" val="1"/>
+              <ma14:wrappingTextBoxFlag xmlns="" xmlns:m="http://schemas.openxmlformats.org/officeDocument/2006/math" xmlns:a14="http://schemas.microsoft.com/office/drawing/2010/main" xmlns:ma14="http://schemas.microsoft.com/office/mac/drawingml/2011/main" val="1"/>
             </a:ext>
           </a:extLst>
         </p:spPr>
@@ -7551,7 +7649,7 @@
           </a:ln>
           <a:extLst>
             <a:ext uri="{C572A759-6A51-4108-AA02-DFA0A04FC94B}">
-              <ma14:wrappingTextBoxFlag xmlns:ma14="http://schemas.microsoft.com/office/mac/drawingml/2011/main" xmlns:a14="http://schemas.microsoft.com/office/drawing/2010/main" xmlns:m="http://schemas.openxmlformats.org/officeDocument/2006/math" xmlns="" val="1"/>
+              <ma14:wrappingTextBoxFlag xmlns="" xmlns:m="http://schemas.openxmlformats.org/officeDocument/2006/math" xmlns:a14="http://schemas.microsoft.com/office/drawing/2010/main" xmlns:ma14="http://schemas.microsoft.com/office/mac/drawingml/2011/main" val="1"/>
             </a:ext>
           </a:extLst>
         </p:spPr>
@@ -7583,7 +7681,7 @@
         </p:blipFill>
         <p:spPr>
           <a:xfrm>
-            <a:off x="1463472" y="4015812"/>
+            <a:off x="1527267" y="2712646"/>
             <a:ext cx="9871279" cy="638230"/>
           </a:xfrm>
           <a:prstGeom prst="rect">
@@ -7610,8 +7708,41 @@
         </p:blipFill>
         <p:spPr>
           <a:xfrm>
-            <a:off x="1486808" y="4874407"/>
+            <a:off x="1433382" y="7936583"/>
             <a:ext cx="4289699" cy="3659744"/>
+          </a:xfrm>
+          <a:prstGeom prst="rect">
+            <a:avLst/>
+          </a:prstGeom>
+          <a:ln w="12700">
+            <a:miter lim="400000"/>
+          </a:ln>
+        </p:spPr>
+      </p:pic>
+      <p:pic>
+        <p:nvPicPr>
+          <p:cNvPr id="2" name="Image" descr="Image">
+            <a:extLst>
+              <a:ext uri="{FF2B5EF4-FFF2-40B4-BE49-F238E27FC236}">
+                <a16:creationId xmlns:a16="http://schemas.microsoft.com/office/drawing/2014/main" id="{79A63B04-A6DD-62FA-E1C1-76DA019546AD}"/>
+              </a:ext>
+            </a:extLst>
+          </p:cNvPr>
+          <p:cNvPicPr>
+            <a:picLocks noChangeAspect="1"/>
+          </p:cNvPicPr>
+          <p:nvPr/>
+        </p:nvPicPr>
+        <p:blipFill>
+          <a:blip r:embed="rId5"/>
+          <a:stretch>
+            <a:fillRect/>
+          </a:stretch>
+        </p:blipFill>
+        <p:spPr>
+          <a:xfrm>
+            <a:off x="1527267" y="3994823"/>
+            <a:ext cx="4195814" cy="3531729"/>
           </a:xfrm>
           <a:prstGeom prst="rect">
             <a:avLst/>
@@ -7666,7 +7797,7 @@
           </a:ln>
           <a:extLst>
             <a:ext uri="{C572A759-6A51-4108-AA02-DFA0A04FC94B}">
-              <ma14:wrappingTextBoxFlag xmlns:ma14="http://schemas.microsoft.com/office/mac/drawingml/2011/main" xmlns:a14="http://schemas.microsoft.com/office/drawing/2010/main" xmlns:m="http://schemas.openxmlformats.org/officeDocument/2006/math" xmlns="" val="1"/>
+              <ma14:wrappingTextBoxFlag xmlns="" xmlns:m="http://schemas.openxmlformats.org/officeDocument/2006/math" xmlns:a14="http://schemas.microsoft.com/office/drawing/2010/main" xmlns:ma14="http://schemas.microsoft.com/office/mac/drawingml/2011/main" val="1"/>
             </a:ext>
           </a:extLst>
         </p:spPr>
@@ -7705,7 +7836,7 @@
           </a:ln>
           <a:extLst>
             <a:ext uri="{C572A759-6A51-4108-AA02-DFA0A04FC94B}">
-              <ma14:wrappingTextBoxFlag xmlns:ma14="http://schemas.microsoft.com/office/mac/drawingml/2011/main" xmlns:a14="http://schemas.microsoft.com/office/drawing/2010/main" xmlns:m="http://schemas.openxmlformats.org/officeDocument/2006/math" xmlns="" val="1"/>
+              <ma14:wrappingTextBoxFlag xmlns="" xmlns:m="http://schemas.openxmlformats.org/officeDocument/2006/math" xmlns:a14="http://schemas.microsoft.com/office/drawing/2010/main" xmlns:ma14="http://schemas.microsoft.com/office/mac/drawingml/2011/main" val="1"/>
             </a:ext>
           </a:extLst>
         </p:spPr>
@@ -7847,7 +7978,7 @@
           </a:ln>
           <a:extLst>
             <a:ext uri="{C572A759-6A51-4108-AA02-DFA0A04FC94B}">
-              <ma14:wrappingTextBoxFlag xmlns:ma14="http://schemas.microsoft.com/office/mac/drawingml/2011/main" xmlns:a14="http://schemas.microsoft.com/office/drawing/2010/main" xmlns:m="http://schemas.openxmlformats.org/officeDocument/2006/math" xmlns="" val="1"/>
+              <ma14:wrappingTextBoxFlag xmlns="" xmlns:m="http://schemas.openxmlformats.org/officeDocument/2006/math" xmlns:a14="http://schemas.microsoft.com/office/drawing/2010/main" xmlns:ma14="http://schemas.microsoft.com/office/mac/drawingml/2011/main" val="1"/>
             </a:ext>
           </a:extLst>
         </p:spPr>
@@ -7886,7 +8017,7 @@
           </a:ln>
           <a:extLst>
             <a:ext uri="{C572A759-6A51-4108-AA02-DFA0A04FC94B}">
-              <ma14:wrappingTextBoxFlag xmlns:ma14="http://schemas.microsoft.com/office/mac/drawingml/2011/main" xmlns:a14="http://schemas.microsoft.com/office/drawing/2010/main" xmlns:m="http://schemas.openxmlformats.org/officeDocument/2006/math" xmlns="" val="1"/>
+              <ma14:wrappingTextBoxFlag xmlns="" xmlns:m="http://schemas.openxmlformats.org/officeDocument/2006/math" xmlns:a14="http://schemas.microsoft.com/office/drawing/2010/main" xmlns:ma14="http://schemas.microsoft.com/office/mac/drawingml/2011/main" val="1"/>
             </a:ext>
           </a:extLst>
         </p:spPr>
@@ -7897,6 +8028,7 @@
           <a:lstStyle/>
           <a:p>
             <a:r>
+              <a:rPr dirty="0"/>
               <a:t>In Unix Pipes let you chain commands together with the pipe ( | ) </a:t>
             </a:r>
           </a:p>
@@ -7921,7 +8053,7 @@
           </a:ln>
           <a:extLst>
             <a:ext uri="{C572A759-6A51-4108-AA02-DFA0A04FC94B}">
-              <ma14:wrappingTextBoxFlag xmlns:ma14="http://schemas.microsoft.com/office/mac/drawingml/2011/main" xmlns:a14="http://schemas.microsoft.com/office/drawing/2010/main" xmlns:m="http://schemas.openxmlformats.org/officeDocument/2006/math" xmlns="" val="1"/>
+              <ma14:wrappingTextBoxFlag xmlns="" xmlns:m="http://schemas.openxmlformats.org/officeDocument/2006/math" xmlns:a14="http://schemas.microsoft.com/office/drawing/2010/main" xmlns:ma14="http://schemas.microsoft.com/office/mac/drawingml/2011/main" val="1"/>
             </a:ext>
           </a:extLst>
         </p:spPr>
@@ -7956,7 +8088,7 @@
           </a:ln>
           <a:extLst>
             <a:ext uri="{C572A759-6A51-4108-AA02-DFA0A04FC94B}">
-              <ma14:wrappingTextBoxFlag xmlns:ma14="http://schemas.microsoft.com/office/mac/drawingml/2011/main" xmlns:a14="http://schemas.microsoft.com/office/drawing/2010/main" xmlns:m="http://schemas.openxmlformats.org/officeDocument/2006/math" xmlns="" val="1"/>
+              <ma14:wrappingTextBoxFlag xmlns="" xmlns:m="http://schemas.openxmlformats.org/officeDocument/2006/math" xmlns:a14="http://schemas.microsoft.com/office/drawing/2010/main" xmlns:ma14="http://schemas.microsoft.com/office/mac/drawingml/2011/main" val="1"/>
             </a:ext>
           </a:extLst>
         </p:spPr>
@@ -7991,7 +8123,7 @@
           </a:ln>
           <a:extLst>
             <a:ext uri="{C572A759-6A51-4108-AA02-DFA0A04FC94B}">
-              <ma14:wrappingTextBoxFlag xmlns:ma14="http://schemas.microsoft.com/office/mac/drawingml/2011/main" xmlns:a14="http://schemas.microsoft.com/office/drawing/2010/main" xmlns:m="http://schemas.openxmlformats.org/officeDocument/2006/math" xmlns="" val="1"/>
+              <ma14:wrappingTextBoxFlag xmlns="" xmlns:m="http://schemas.openxmlformats.org/officeDocument/2006/math" xmlns:a14="http://schemas.microsoft.com/office/drawing/2010/main" xmlns:ma14="http://schemas.microsoft.com/office/mac/drawingml/2011/main" val="1"/>
             </a:ext>
           </a:extLst>
         </p:spPr>
@@ -8026,7 +8158,7 @@
           </a:ln>
           <a:extLst>
             <a:ext uri="{C572A759-6A51-4108-AA02-DFA0A04FC94B}">
-              <ma14:wrappingTextBoxFlag xmlns:ma14="http://schemas.microsoft.com/office/mac/drawingml/2011/main" xmlns:a14="http://schemas.microsoft.com/office/drawing/2010/main" xmlns:m="http://schemas.openxmlformats.org/officeDocument/2006/math" xmlns="" val="1"/>
+              <ma14:wrappingTextBoxFlag xmlns="" xmlns:m="http://schemas.openxmlformats.org/officeDocument/2006/math" xmlns:a14="http://schemas.microsoft.com/office/drawing/2010/main" xmlns:ma14="http://schemas.microsoft.com/office/mac/drawingml/2011/main" val="1"/>
             </a:ext>
           </a:extLst>
         </p:spPr>
@@ -8061,7 +8193,7 @@
           </a:ln>
           <a:extLst>
             <a:ext uri="{C572A759-6A51-4108-AA02-DFA0A04FC94B}">
-              <ma14:wrappingTextBoxFlag xmlns:ma14="http://schemas.microsoft.com/office/mac/drawingml/2011/main" xmlns:a14="http://schemas.microsoft.com/office/drawing/2010/main" xmlns:m="http://schemas.openxmlformats.org/officeDocument/2006/math" xmlns="" val="1"/>
+              <ma14:wrappingTextBoxFlag xmlns="" xmlns:m="http://schemas.openxmlformats.org/officeDocument/2006/math" xmlns:a14="http://schemas.microsoft.com/office/drawing/2010/main" xmlns:ma14="http://schemas.microsoft.com/office/mac/drawingml/2011/main" val="1"/>
             </a:ext>
           </a:extLst>
         </p:spPr>
@@ -8133,7 +8265,7 @@
           </a:ln>
           <a:extLst>
             <a:ext uri="{C572A759-6A51-4108-AA02-DFA0A04FC94B}">
-              <ma14:wrappingTextBoxFlag xmlns:ma14="http://schemas.microsoft.com/office/mac/drawingml/2011/main" xmlns:a14="http://schemas.microsoft.com/office/drawing/2010/main" xmlns:m="http://schemas.openxmlformats.org/officeDocument/2006/math" xmlns="" val="1"/>
+              <ma14:wrappingTextBoxFlag xmlns="" xmlns:m="http://schemas.openxmlformats.org/officeDocument/2006/math" xmlns:a14="http://schemas.microsoft.com/office/drawing/2010/main" xmlns:ma14="http://schemas.microsoft.com/office/mac/drawingml/2011/main" val="1"/>
             </a:ext>
           </a:extLst>
         </p:spPr>
@@ -8177,7 +8309,7 @@
           </a:ln>
           <a:extLst>
             <a:ext uri="{C572A759-6A51-4108-AA02-DFA0A04FC94B}">
-              <ma14:wrappingTextBoxFlag xmlns:ma14="http://schemas.microsoft.com/office/mac/drawingml/2011/main" xmlns:a14="http://schemas.microsoft.com/office/drawing/2010/main" xmlns:m="http://schemas.openxmlformats.org/officeDocument/2006/math" xmlns="" val="1"/>
+              <ma14:wrappingTextBoxFlag xmlns="" xmlns:m="http://schemas.openxmlformats.org/officeDocument/2006/math" xmlns:a14="http://schemas.microsoft.com/office/drawing/2010/main" xmlns:ma14="http://schemas.microsoft.com/office/mac/drawingml/2011/main" val="1"/>
             </a:ext>
           </a:extLst>
         </p:spPr>
@@ -8216,7 +8348,7 @@
           </a:ln>
           <a:extLst>
             <a:ext uri="{C572A759-6A51-4108-AA02-DFA0A04FC94B}">
-              <ma14:wrappingTextBoxFlag xmlns:ma14="http://schemas.microsoft.com/office/mac/drawingml/2011/main" xmlns:a14="http://schemas.microsoft.com/office/drawing/2010/main" xmlns:m="http://schemas.openxmlformats.org/officeDocument/2006/math" xmlns="" val="1"/>
+              <ma14:wrappingTextBoxFlag xmlns="" xmlns:m="http://schemas.openxmlformats.org/officeDocument/2006/math" xmlns:a14="http://schemas.microsoft.com/office/drawing/2010/main" xmlns:ma14="http://schemas.microsoft.com/office/mac/drawingml/2011/main" val="1"/>
             </a:ext>
           </a:extLst>
         </p:spPr>
@@ -8255,7 +8387,7 @@
           </a:ln>
           <a:extLst>
             <a:ext uri="{C572A759-6A51-4108-AA02-DFA0A04FC94B}">
-              <ma14:wrappingTextBoxFlag xmlns:ma14="http://schemas.microsoft.com/office/mac/drawingml/2011/main" xmlns:a14="http://schemas.microsoft.com/office/drawing/2010/main" xmlns:m="http://schemas.openxmlformats.org/officeDocument/2006/math" xmlns="" val="1"/>
+              <ma14:wrappingTextBoxFlag xmlns="" xmlns:m="http://schemas.openxmlformats.org/officeDocument/2006/math" xmlns:a14="http://schemas.microsoft.com/office/drawing/2010/main" xmlns:ma14="http://schemas.microsoft.com/office/mac/drawingml/2011/main" val="1"/>
             </a:ext>
           </a:extLst>
         </p:spPr>
@@ -8294,7 +8426,7 @@
           </a:ln>
           <a:extLst>
             <a:ext uri="{C572A759-6A51-4108-AA02-DFA0A04FC94B}">
-              <ma14:wrappingTextBoxFlag xmlns:ma14="http://schemas.microsoft.com/office/mac/drawingml/2011/main" xmlns:a14="http://schemas.microsoft.com/office/drawing/2010/main" xmlns:m="http://schemas.openxmlformats.org/officeDocument/2006/math" xmlns="" val="1"/>
+              <ma14:wrappingTextBoxFlag xmlns="" xmlns:m="http://schemas.openxmlformats.org/officeDocument/2006/math" xmlns:a14="http://schemas.microsoft.com/office/drawing/2010/main" xmlns:ma14="http://schemas.microsoft.com/office/mac/drawingml/2011/main" val="1"/>
             </a:ext>
           </a:extLst>
         </p:spPr>
@@ -8322,8 +8454,8 @@
         </p:nvSpPr>
         <p:spPr>
           <a:xfrm>
-            <a:off x="9079829" y="8534915"/>
-            <a:ext cx="9902039" cy="634899"/>
+            <a:off x="8931801" y="8534915"/>
+            <a:ext cx="11137665" cy="656590"/>
           </a:xfrm>
           <a:prstGeom prst="rect">
             <a:avLst/>
@@ -8333,7 +8465,7 @@
           </a:ln>
           <a:extLst>
             <a:ext uri="{C572A759-6A51-4108-AA02-DFA0A04FC94B}">
-              <ma14:wrappingTextBoxFlag xmlns:ma14="http://schemas.microsoft.com/office/mac/drawingml/2011/main" xmlns:a14="http://schemas.microsoft.com/office/drawing/2010/main" xmlns:m="http://schemas.openxmlformats.org/officeDocument/2006/math" xmlns="" val="1"/>
+              <ma14:wrappingTextBoxFlag xmlns="" xmlns:m="http://schemas.openxmlformats.org/officeDocument/2006/math" xmlns:a14="http://schemas.microsoft.com/office/drawing/2010/main" xmlns:ma14="http://schemas.microsoft.com/office/mac/drawingml/2011/main" val="1"/>
             </a:ext>
           </a:extLst>
         </p:spPr>
@@ -8348,7 +8480,24 @@
           </a:lstStyle>
           <a:p>
             <a:r>
-              <a:t>NIH Reporter (on github as worldwide2020.csv) </a:t>
+              <a:rPr dirty="0"/>
+              <a:t>NIH Reporter (on </a:t>
+            </a:r>
+            <a:r>
+              <a:rPr dirty="0" err="1"/>
+              <a:t>github</a:t>
+            </a:r>
+            <a:r>
+              <a:rPr dirty="0"/>
+              <a:t> as </a:t>
+            </a:r>
+            <a:r>
+              <a:rPr lang="en-US" dirty="0"/>
+              <a:t>data/W</a:t>
+            </a:r>
+            <a:r>
+              <a:rPr dirty="0"/>
+              <a:t>orldwide2020.csv) </a:t>
             </a:r>
           </a:p>
         </p:txBody>
@@ -8372,7 +8521,7 @@
           </a:ln>
           <a:extLst>
             <a:ext uri="{C572A759-6A51-4108-AA02-DFA0A04FC94B}">
-              <ma14:wrappingTextBoxFlag xmlns:ma14="http://schemas.microsoft.com/office/mac/drawingml/2011/main" xmlns:a14="http://schemas.microsoft.com/office/drawing/2010/main" xmlns:m="http://schemas.openxmlformats.org/officeDocument/2006/math" xmlns="" val="1"/>
+              <ma14:wrappingTextBoxFlag xmlns="" xmlns:m="http://schemas.openxmlformats.org/officeDocument/2006/math" xmlns:a14="http://schemas.microsoft.com/office/drawing/2010/main" xmlns:ma14="http://schemas.microsoft.com/office/mac/drawingml/2011/main" val="1"/>
             </a:ext>
           </a:extLst>
         </p:spPr>
@@ -8411,7 +8560,7 @@
           </a:ln>
           <a:extLst>
             <a:ext uri="{C572A759-6A51-4108-AA02-DFA0A04FC94B}">
-              <ma14:wrappingTextBoxFlag xmlns:ma14="http://schemas.microsoft.com/office/mac/drawingml/2011/main" xmlns:a14="http://schemas.microsoft.com/office/drawing/2010/main" xmlns:m="http://schemas.openxmlformats.org/officeDocument/2006/math" xmlns="" val="1"/>
+              <ma14:wrappingTextBoxFlag xmlns="" xmlns:m="http://schemas.openxmlformats.org/officeDocument/2006/math" xmlns:a14="http://schemas.microsoft.com/office/drawing/2010/main" xmlns:ma14="http://schemas.microsoft.com/office/mac/drawingml/2011/main" val="1"/>
             </a:ext>
           </a:extLst>
         </p:spPr>
@@ -8426,7 +8575,12 @@
           </a:lstStyle>
           <a:p>
             <a:r>
-              <a:t>install.packages('nycflights13') </a:t>
+              <a:rPr dirty="0" err="1"/>
+              <a:t>install.packages</a:t>
+            </a:r>
+            <a:r>
+              <a:rPr dirty="0"/>
+              <a:t>('nycflights13') </a:t>
             </a:r>
           </a:p>
         </p:txBody>
@@ -8450,7 +8604,7 @@
           </a:ln>
           <a:extLst>
             <a:ext uri="{C572A759-6A51-4108-AA02-DFA0A04FC94B}">
-              <ma14:wrappingTextBoxFlag xmlns:ma14="http://schemas.microsoft.com/office/mac/drawingml/2011/main" xmlns:a14="http://schemas.microsoft.com/office/drawing/2010/main" xmlns:m="http://schemas.openxmlformats.org/officeDocument/2006/math" xmlns="" val="1"/>
+              <ma14:wrappingTextBoxFlag xmlns="" xmlns:m="http://schemas.openxmlformats.org/officeDocument/2006/math" xmlns:a14="http://schemas.microsoft.com/office/drawing/2010/main" xmlns:ma14="http://schemas.microsoft.com/office/mac/drawingml/2011/main" val="1"/>
             </a:ext>
           </a:extLst>
         </p:spPr>
@@ -8489,7 +8643,7 @@
           </a:ln>
           <a:extLst>
             <a:ext uri="{C572A759-6A51-4108-AA02-DFA0A04FC94B}">
-              <ma14:wrappingTextBoxFlag xmlns:ma14="http://schemas.microsoft.com/office/mac/drawingml/2011/main" xmlns:a14="http://schemas.microsoft.com/office/drawing/2010/main" xmlns:m="http://schemas.openxmlformats.org/officeDocument/2006/math" xmlns="" val="1"/>
+              <ma14:wrappingTextBoxFlag xmlns="" xmlns:m="http://schemas.openxmlformats.org/officeDocument/2006/math" xmlns:a14="http://schemas.microsoft.com/office/drawing/2010/main" xmlns:ma14="http://schemas.microsoft.com/office/mac/drawingml/2011/main" val="1"/>
             </a:ext>
           </a:extLst>
         </p:spPr>
@@ -8528,7 +8682,7 @@
           </a:ln>
           <a:extLst>
             <a:ext uri="{C572A759-6A51-4108-AA02-DFA0A04FC94B}">
-              <ma14:wrappingTextBoxFlag xmlns:ma14="http://schemas.microsoft.com/office/mac/drawingml/2011/main" xmlns:a14="http://schemas.microsoft.com/office/drawing/2010/main" xmlns:m="http://schemas.openxmlformats.org/officeDocument/2006/math" xmlns="" val="1"/>
+              <ma14:wrappingTextBoxFlag xmlns="" xmlns:m="http://schemas.openxmlformats.org/officeDocument/2006/math" xmlns:a14="http://schemas.microsoft.com/office/drawing/2010/main" xmlns:ma14="http://schemas.microsoft.com/office/mac/drawingml/2011/main" val="1"/>
             </a:ext>
           </a:extLst>
         </p:spPr>
@@ -8593,7 +8747,7 @@
           </a:ln>
           <a:extLst>
             <a:ext uri="{C572A759-6A51-4108-AA02-DFA0A04FC94B}">
-              <ma14:wrappingTextBoxFlag xmlns:ma14="http://schemas.microsoft.com/office/mac/drawingml/2011/main" xmlns:a14="http://schemas.microsoft.com/office/drawing/2010/main" xmlns:m="http://schemas.openxmlformats.org/officeDocument/2006/math" xmlns="" val="1"/>
+              <ma14:wrappingTextBoxFlag xmlns="" xmlns:m="http://schemas.openxmlformats.org/officeDocument/2006/math" xmlns:a14="http://schemas.microsoft.com/office/drawing/2010/main" xmlns:ma14="http://schemas.microsoft.com/office/mac/drawingml/2011/main" val="1"/>
             </a:ext>
           </a:extLst>
         </p:spPr>
@@ -8632,7 +8786,7 @@
           </a:ln>
           <a:extLst>
             <a:ext uri="{C572A759-6A51-4108-AA02-DFA0A04FC94B}">
-              <ma14:wrappingTextBoxFlag xmlns:ma14="http://schemas.microsoft.com/office/mac/drawingml/2011/main" xmlns:a14="http://schemas.microsoft.com/office/drawing/2010/main" xmlns:m="http://schemas.openxmlformats.org/officeDocument/2006/math" xmlns="" val="1"/>
+              <ma14:wrappingTextBoxFlag xmlns="" xmlns:m="http://schemas.openxmlformats.org/officeDocument/2006/math" xmlns:a14="http://schemas.microsoft.com/office/drawing/2010/main" xmlns:ma14="http://schemas.microsoft.com/office/mac/drawingml/2011/main" val="1"/>
             </a:ext>
           </a:extLst>
         </p:spPr>
@@ -8728,7 +8882,7 @@
           </a:ln>
           <a:extLst>
             <a:ext uri="{C572A759-6A51-4108-AA02-DFA0A04FC94B}">
-              <ma14:wrappingTextBoxFlag xmlns:ma14="http://schemas.microsoft.com/office/mac/drawingml/2011/main" xmlns:a14="http://schemas.microsoft.com/office/drawing/2010/main" xmlns:m="http://schemas.openxmlformats.org/officeDocument/2006/math" xmlns="" val="1"/>
+              <ma14:wrappingTextBoxFlag xmlns="" xmlns:m="http://schemas.openxmlformats.org/officeDocument/2006/math" xmlns:a14="http://schemas.microsoft.com/office/drawing/2010/main" xmlns:ma14="http://schemas.microsoft.com/office/mac/drawingml/2011/main" val="1"/>
             </a:ext>
           </a:extLst>
         </p:spPr>
@@ -8789,7 +8943,7 @@
           </a:ln>
           <a:extLst>
             <a:ext uri="{C572A759-6A51-4108-AA02-DFA0A04FC94B}">
-              <ma14:wrappingTextBoxFlag xmlns:ma14="http://schemas.microsoft.com/office/mac/drawingml/2011/main" xmlns:a14="http://schemas.microsoft.com/office/drawing/2010/main" xmlns:m="http://schemas.openxmlformats.org/officeDocument/2006/math" xmlns="" val="1"/>
+              <ma14:wrappingTextBoxFlag xmlns="" xmlns:m="http://schemas.openxmlformats.org/officeDocument/2006/math" xmlns:a14="http://schemas.microsoft.com/office/drawing/2010/main" xmlns:ma14="http://schemas.microsoft.com/office/mac/drawingml/2011/main" val="1"/>
             </a:ext>
           </a:extLst>
         </p:spPr>
@@ -8828,7 +8982,7 @@
           </a:ln>
           <a:extLst>
             <a:ext uri="{C572A759-6A51-4108-AA02-DFA0A04FC94B}">
-              <ma14:wrappingTextBoxFlag xmlns:ma14="http://schemas.microsoft.com/office/mac/drawingml/2011/main" xmlns:a14="http://schemas.microsoft.com/office/drawing/2010/main" xmlns:m="http://schemas.openxmlformats.org/officeDocument/2006/math" xmlns="" val="1"/>
+              <ma14:wrappingTextBoxFlag xmlns="" xmlns:m="http://schemas.openxmlformats.org/officeDocument/2006/math" xmlns:a14="http://schemas.microsoft.com/office/drawing/2010/main" xmlns:ma14="http://schemas.microsoft.com/office/mac/drawingml/2011/main" val="1"/>
             </a:ext>
           </a:extLst>
         </p:spPr>
@@ -8936,7 +9090,7 @@
           </a:ln>
           <a:extLst>
             <a:ext uri="{C572A759-6A51-4108-AA02-DFA0A04FC94B}">
-              <ma14:wrappingTextBoxFlag xmlns:ma14="http://schemas.microsoft.com/office/mac/drawingml/2011/main" xmlns:a14="http://schemas.microsoft.com/office/drawing/2010/main" xmlns:m="http://schemas.openxmlformats.org/officeDocument/2006/math" xmlns="" val="1"/>
+              <ma14:wrappingTextBoxFlag xmlns="" xmlns:m="http://schemas.openxmlformats.org/officeDocument/2006/math" xmlns:a14="http://schemas.microsoft.com/office/drawing/2010/main" xmlns:ma14="http://schemas.microsoft.com/office/mac/drawingml/2011/main" val="1"/>
             </a:ext>
           </a:extLst>
         </p:spPr>
@@ -8975,7 +9129,7 @@
           </a:ln>
           <a:extLst>
             <a:ext uri="{C572A759-6A51-4108-AA02-DFA0A04FC94B}">
-              <ma14:wrappingTextBoxFlag xmlns:ma14="http://schemas.microsoft.com/office/mac/drawingml/2011/main" xmlns:a14="http://schemas.microsoft.com/office/drawing/2010/main" xmlns:m="http://schemas.openxmlformats.org/officeDocument/2006/math" xmlns="" val="1"/>
+              <ma14:wrappingTextBoxFlag xmlns="" xmlns:m="http://schemas.openxmlformats.org/officeDocument/2006/math" xmlns:a14="http://schemas.microsoft.com/office/drawing/2010/main" xmlns:ma14="http://schemas.microsoft.com/office/mac/drawingml/2011/main" val="1"/>
             </a:ext>
           </a:extLst>
         </p:spPr>
@@ -9130,7 +9284,7 @@
           </a:ln>
           <a:extLst>
             <a:ext uri="{C572A759-6A51-4108-AA02-DFA0A04FC94B}">
-              <ma14:wrappingTextBoxFlag xmlns:ma14="http://schemas.microsoft.com/office/mac/drawingml/2011/main" xmlns:a14="http://schemas.microsoft.com/office/drawing/2010/main" xmlns:m="http://schemas.openxmlformats.org/officeDocument/2006/math" xmlns="" val="1"/>
+              <ma14:wrappingTextBoxFlag xmlns="" xmlns:m="http://schemas.openxmlformats.org/officeDocument/2006/math" xmlns:a14="http://schemas.microsoft.com/office/drawing/2010/main" xmlns:ma14="http://schemas.microsoft.com/office/mac/drawingml/2011/main" val="1"/>
             </a:ext>
           </a:extLst>
         </p:spPr>
@@ -9199,7 +9353,7 @@
           </a:ln>
           <a:extLst>
             <a:ext uri="{C572A759-6A51-4108-AA02-DFA0A04FC94B}">
-              <ma14:wrappingTextBoxFlag xmlns:ma14="http://schemas.microsoft.com/office/mac/drawingml/2011/main" xmlns:a14="http://schemas.microsoft.com/office/drawing/2010/main" xmlns:m="http://schemas.openxmlformats.org/officeDocument/2006/math" xmlns="" val="1"/>
+              <ma14:wrappingTextBoxFlag xmlns="" xmlns:m="http://schemas.openxmlformats.org/officeDocument/2006/math" xmlns:a14="http://schemas.microsoft.com/office/drawing/2010/main" xmlns:ma14="http://schemas.microsoft.com/office/mac/drawingml/2011/main" val="1"/>
             </a:ext>
           </a:extLst>
         </p:spPr>
@@ -9863,7 +10017,7 @@
           </a:ln>
           <a:extLst>
             <a:ext uri="{C572A759-6A51-4108-AA02-DFA0A04FC94B}">
-              <ma14:wrappingTextBoxFlag xmlns:ma14="http://schemas.microsoft.com/office/mac/drawingml/2011/main" xmlns:a14="http://schemas.microsoft.com/office/drawing/2010/main" xmlns:m="http://schemas.openxmlformats.org/officeDocument/2006/math" xmlns="" val="1"/>
+              <ma14:wrappingTextBoxFlag xmlns="" xmlns:m="http://schemas.openxmlformats.org/officeDocument/2006/math" xmlns:a14="http://schemas.microsoft.com/office/drawing/2010/main" xmlns:ma14="http://schemas.microsoft.com/office/mac/drawingml/2011/main" val="1"/>
             </a:ext>
           </a:extLst>
         </p:spPr>
@@ -9907,7 +10061,7 @@
           </a:ln>
           <a:extLst>
             <a:ext uri="{C572A759-6A51-4108-AA02-DFA0A04FC94B}">
-              <ma14:wrappingTextBoxFlag xmlns:ma14="http://schemas.microsoft.com/office/mac/drawingml/2011/main" xmlns:a14="http://schemas.microsoft.com/office/drawing/2010/main" xmlns:m="http://schemas.openxmlformats.org/officeDocument/2006/math" xmlns="" val="1"/>
+              <ma14:wrappingTextBoxFlag xmlns="" xmlns:m="http://schemas.openxmlformats.org/officeDocument/2006/math" xmlns:a14="http://schemas.microsoft.com/office/drawing/2010/main" xmlns:ma14="http://schemas.microsoft.com/office/mac/drawingml/2011/main" val="1"/>
             </a:ext>
           </a:extLst>
         </p:spPr>
@@ -9928,7 +10082,16 @@
               </a:defRPr>
             </a:pPr>
             <a:r>
-              <a:t>Install R http://www.r-project.org/</a:t>
+              <a:rPr dirty="0"/>
+              <a:t>Install R http://</a:t>
+            </a:r>
+            <a:r>
+              <a:rPr dirty="0" err="1"/>
+              <a:t>www.r-project.org</a:t>
+            </a:r>
+            <a:r>
+              <a:rPr dirty="0"/>
+              <a:t>/</a:t>
             </a:r>
           </a:p>
           <a:p>
@@ -9943,7 +10106,32 @@
               </a:defRPr>
             </a:pPr>
             <a:r>
-              <a:t>Download Rstudio https://www.rstudio.com/products/rstudio/</a:t>
+              <a:rPr dirty="0"/>
+              <a:t>Download </a:t>
+            </a:r>
+            <a:r>
+              <a:rPr dirty="0" err="1"/>
+              <a:t>Rstudio</a:t>
+            </a:r>
+            <a:r>
+              <a:rPr dirty="0"/>
+              <a:t> https://</a:t>
+            </a:r>
+            <a:r>
+              <a:rPr dirty="0" err="1"/>
+              <a:t>www.rstudio.com</a:t>
+            </a:r>
+            <a:r>
+              <a:rPr dirty="0"/>
+              <a:t>/products/</a:t>
+            </a:r>
+            <a:r>
+              <a:rPr dirty="0" err="1"/>
+              <a:t>rstudio</a:t>
+            </a:r>
+            <a:r>
+              <a:rPr dirty="0"/>
+              <a:t>/</a:t>
             </a:r>
           </a:p>
           <a:p>
@@ -9955,7 +10143,7 @@
                 <a:sym typeface="Avenir Next Regular"/>
               </a:defRPr>
             </a:pPr>
-            <a:endParaRPr/>
+            <a:endParaRPr dirty="0"/>
           </a:p>
           <a:p>
             <a:pPr algn="l">
@@ -9967,6 +10155,7 @@
               </a:defRPr>
             </a:pPr>
             <a:r>
+              <a:rPr dirty="0"/>
               <a:t>Alternate route</a:t>
             </a:r>
           </a:p>
@@ -9980,15 +10169,17 @@
               </a:defRPr>
             </a:pPr>
             <a:r>
+              <a:rPr dirty="0"/>
               <a:t>login at </a:t>
             </a:r>
             <a:r>
-              <a:rPr u="sng">
+              <a:rPr u="sng" dirty="0">
                 <a:hlinkClick r:id="rId2"/>
               </a:rPr>
               <a:t>ondemand.rc.unc.edu</a:t>
             </a:r>
             <a:r>
+              <a:rPr dirty="0"/>
               <a:t> </a:t>
             </a:r>
           </a:p>
@@ -10066,7 +10257,7 @@
           </a:ln>
           <a:extLst>
             <a:ext uri="{C572A759-6A51-4108-AA02-DFA0A04FC94B}">
-              <ma14:wrappingTextBoxFlag xmlns:ma14="http://schemas.microsoft.com/office/mac/drawingml/2011/main" xmlns:a14="http://schemas.microsoft.com/office/drawing/2010/main" xmlns:m="http://schemas.openxmlformats.org/officeDocument/2006/math" xmlns="" val="1"/>
+              <ma14:wrappingTextBoxFlag xmlns="" xmlns:m="http://schemas.openxmlformats.org/officeDocument/2006/math" xmlns:a14="http://schemas.microsoft.com/office/drawing/2010/main" xmlns:ma14="http://schemas.microsoft.com/office/mac/drawingml/2011/main" val="1"/>
             </a:ext>
           </a:extLst>
         </p:spPr>
@@ -10105,7 +10296,7 @@
           </a:ln>
           <a:extLst>
             <a:ext uri="{C572A759-6A51-4108-AA02-DFA0A04FC94B}">
-              <ma14:wrappingTextBoxFlag xmlns:ma14="http://schemas.microsoft.com/office/mac/drawingml/2011/main" xmlns:a14="http://schemas.microsoft.com/office/drawing/2010/main" xmlns:m="http://schemas.openxmlformats.org/officeDocument/2006/math" xmlns="" val="1"/>
+              <ma14:wrappingTextBoxFlag xmlns="" xmlns:m="http://schemas.openxmlformats.org/officeDocument/2006/math" xmlns:a14="http://schemas.microsoft.com/office/drawing/2010/main" xmlns:ma14="http://schemas.microsoft.com/office/mac/drawingml/2011/main" val="1"/>
             </a:ext>
           </a:extLst>
         </p:spPr>
@@ -10208,7 +10399,7 @@
           </a:ln>
           <a:extLst>
             <a:ext uri="{C572A759-6A51-4108-AA02-DFA0A04FC94B}">
-              <ma14:wrappingTextBoxFlag xmlns:ma14="http://schemas.microsoft.com/office/mac/drawingml/2011/main" xmlns:a14="http://schemas.microsoft.com/office/drawing/2010/main" xmlns:m="http://schemas.openxmlformats.org/officeDocument/2006/math" xmlns="" val="1"/>
+              <ma14:wrappingTextBoxFlag xmlns="" xmlns:m="http://schemas.openxmlformats.org/officeDocument/2006/math" xmlns:a14="http://schemas.microsoft.com/office/drawing/2010/main" xmlns:ma14="http://schemas.microsoft.com/office/mac/drawingml/2011/main" val="1"/>
             </a:ext>
           </a:extLst>
         </p:spPr>
@@ -10247,7 +10438,7 @@
           </a:ln>
           <a:extLst>
             <a:ext uri="{C572A759-6A51-4108-AA02-DFA0A04FC94B}">
-              <ma14:wrappingTextBoxFlag xmlns:ma14="http://schemas.microsoft.com/office/mac/drawingml/2011/main" xmlns:a14="http://schemas.microsoft.com/office/drawing/2010/main" xmlns:m="http://schemas.openxmlformats.org/officeDocument/2006/math" xmlns="" val="1"/>
+              <ma14:wrappingTextBoxFlag xmlns="" xmlns:m="http://schemas.openxmlformats.org/officeDocument/2006/math" xmlns:a14="http://schemas.microsoft.com/office/drawing/2010/main" xmlns:ma14="http://schemas.microsoft.com/office/mac/drawingml/2011/main" val="1"/>
             </a:ext>
           </a:extLst>
         </p:spPr>
@@ -10333,7 +10524,7 @@
           </a:ln>
           <a:extLst>
             <a:ext uri="{C572A759-6A51-4108-AA02-DFA0A04FC94B}">
-              <ma14:wrappingTextBoxFlag xmlns:ma14="http://schemas.microsoft.com/office/mac/drawingml/2011/main" xmlns:a14="http://schemas.microsoft.com/office/drawing/2010/main" xmlns:m="http://schemas.openxmlformats.org/officeDocument/2006/math" xmlns="" val="1"/>
+              <ma14:wrappingTextBoxFlag xmlns="" xmlns:m="http://schemas.openxmlformats.org/officeDocument/2006/math" xmlns:a14="http://schemas.microsoft.com/office/drawing/2010/main" xmlns:ma14="http://schemas.microsoft.com/office/mac/drawingml/2011/main" val="1"/>
             </a:ext>
           </a:extLst>
         </p:spPr>
@@ -10368,7 +10559,7 @@
           </a:ln>
           <a:extLst>
             <a:ext uri="{C572A759-6A51-4108-AA02-DFA0A04FC94B}">
-              <ma14:wrappingTextBoxFlag xmlns:ma14="http://schemas.microsoft.com/office/mac/drawingml/2011/main" xmlns:a14="http://schemas.microsoft.com/office/drawing/2010/main" xmlns:m="http://schemas.openxmlformats.org/officeDocument/2006/math" xmlns="" val="1"/>
+              <ma14:wrappingTextBoxFlag xmlns="" xmlns:m="http://schemas.openxmlformats.org/officeDocument/2006/math" xmlns:a14="http://schemas.microsoft.com/office/drawing/2010/main" xmlns:ma14="http://schemas.microsoft.com/office/mac/drawingml/2011/main" val="1"/>
             </a:ext>
           </a:extLst>
         </p:spPr>
@@ -10429,7 +10620,7 @@
           </a:ln>
           <a:extLst>
             <a:ext uri="{C572A759-6A51-4108-AA02-DFA0A04FC94B}">
-              <ma14:wrappingTextBoxFlag xmlns:ma14="http://schemas.microsoft.com/office/mac/drawingml/2011/main" xmlns:a14="http://schemas.microsoft.com/office/drawing/2010/main" xmlns:m="http://schemas.openxmlformats.org/officeDocument/2006/math" xmlns="" val="1"/>
+              <ma14:wrappingTextBoxFlag xmlns="" xmlns:m="http://schemas.openxmlformats.org/officeDocument/2006/math" xmlns:a14="http://schemas.microsoft.com/office/drawing/2010/main" xmlns:ma14="http://schemas.microsoft.com/office/mac/drawingml/2011/main" val="1"/>
             </a:ext>
           </a:extLst>
         </p:spPr>
@@ -10464,7 +10655,7 @@
           </a:ln>
           <a:extLst>
             <a:ext uri="{C572A759-6A51-4108-AA02-DFA0A04FC94B}">
-              <ma14:wrappingTextBoxFlag xmlns:ma14="http://schemas.microsoft.com/office/mac/drawingml/2011/main" xmlns:a14="http://schemas.microsoft.com/office/drawing/2010/main" xmlns:m="http://schemas.openxmlformats.org/officeDocument/2006/math" xmlns="" val="1"/>
+              <ma14:wrappingTextBoxFlag xmlns="" xmlns:m="http://schemas.openxmlformats.org/officeDocument/2006/math" xmlns:a14="http://schemas.microsoft.com/office/drawing/2010/main" xmlns:ma14="http://schemas.microsoft.com/office/mac/drawingml/2011/main" val="1"/>
             </a:ext>
           </a:extLst>
         </p:spPr>

</xml_diff>